<commit_message>
working on read me
</commit_message>
<xml_diff>
--- a/images/Final Presentation.pptx
+++ b/images/Final Presentation.pptx
@@ -25,6 +25,10 @@
     <p:sldId id="270" r:id="rId20"/>
     <p:sldId id="271" r:id="rId21"/>
     <p:sldId id="272" r:id="rId22"/>
+    <p:sldId id="273" r:id="rId23"/>
+    <p:sldId id="274" r:id="rId24"/>
+    <p:sldId id="275" r:id="rId25"/>
+    <p:sldId id="276" r:id="rId26"/>
   </p:sldIdLst>
   <p:sldSz cy="5143500" cx="9144000"/>
   <p:notesSz cx="6858000" cy="9144000"/>
@@ -806,7 +810,7 @@
   <p:cSld>
     <p:spTree>
       <p:nvGrpSpPr>
-        <p:cNvPr id="108" name="Shape 108"/>
+        <p:cNvPr id="111" name="Shape 111"/>
         <p:cNvGrpSpPr/>
         <p:nvPr/>
       </p:nvGrpSpPr>
@@ -820,7 +824,7 @@
       </p:grpSpPr>
       <p:sp>
         <p:nvSpPr>
-          <p:cNvPr id="109" name="Google Shape;109;g7739f47d56_0_63:notes"/>
+          <p:cNvPr id="112" name="Google Shape;112;g7739f47d56_0_63:notes"/>
           <p:cNvSpPr/>
           <p:nvPr>
             <p:ph idx="2" type="sldImg"/>
@@ -855,7 +859,7 @@
       </p:sp>
       <p:sp>
         <p:nvSpPr>
-          <p:cNvPr id="110" name="Google Shape;110;g7739f47d56_0_63:notes"/>
+          <p:cNvPr id="113" name="Google Shape;113;g7739f47d56_0_63:notes"/>
           <p:cNvSpPr txBox="1"/>
           <p:nvPr>
             <p:ph idx="1" type="body"/>
@@ -905,7 +909,7 @@
   <p:cSld>
     <p:spTree>
       <p:nvGrpSpPr>
-        <p:cNvPr id="116" name="Shape 116"/>
+        <p:cNvPr id="119" name="Shape 119"/>
         <p:cNvGrpSpPr/>
         <p:nvPr/>
       </p:nvGrpSpPr>
@@ -919,7 +923,7 @@
       </p:grpSpPr>
       <p:sp>
         <p:nvSpPr>
-          <p:cNvPr id="117" name="Google Shape;117;g7739f47d56_0_121:notes"/>
+          <p:cNvPr id="120" name="Google Shape;120;g7739f47d56_0_121:notes"/>
           <p:cNvSpPr/>
           <p:nvPr>
             <p:ph idx="2" type="sldImg"/>
@@ -954,7 +958,7 @@
       </p:sp>
       <p:sp>
         <p:nvSpPr>
-          <p:cNvPr id="118" name="Google Shape;118;g7739f47d56_0_121:notes"/>
+          <p:cNvPr id="121" name="Google Shape;121;g7739f47d56_0_121:notes"/>
           <p:cNvSpPr txBox="1"/>
           <p:nvPr>
             <p:ph idx="1" type="body"/>
@@ -1004,7 +1008,7 @@
   <p:cSld>
     <p:spTree>
       <p:nvGrpSpPr>
-        <p:cNvPr id="125" name="Shape 125"/>
+        <p:cNvPr id="128" name="Shape 128"/>
         <p:cNvGrpSpPr/>
         <p:nvPr/>
       </p:nvGrpSpPr>
@@ -1018,7 +1022,7 @@
       </p:grpSpPr>
       <p:sp>
         <p:nvSpPr>
-          <p:cNvPr id="126" name="Google Shape;126;g7739f47d56_0_105:notes"/>
+          <p:cNvPr id="129" name="Google Shape;129;g7739f47d56_0_105:notes"/>
           <p:cNvSpPr/>
           <p:nvPr>
             <p:ph idx="2" type="sldImg"/>
@@ -1053,7 +1057,7 @@
       </p:sp>
       <p:sp>
         <p:nvSpPr>
-          <p:cNvPr id="127" name="Google Shape;127;g7739f47d56_0_105:notes"/>
+          <p:cNvPr id="130" name="Google Shape;130;g7739f47d56_0_105:notes"/>
           <p:cNvSpPr txBox="1"/>
           <p:nvPr>
             <p:ph idx="1" type="body"/>
@@ -1103,7 +1107,7 @@
   <p:cSld>
     <p:spTree>
       <p:nvGrpSpPr>
-        <p:cNvPr id="131" name="Shape 131"/>
+        <p:cNvPr id="134" name="Shape 134"/>
         <p:cNvGrpSpPr/>
         <p:nvPr/>
       </p:nvGrpSpPr>
@@ -1117,7 +1121,7 @@
       </p:grpSpPr>
       <p:sp>
         <p:nvSpPr>
-          <p:cNvPr id="132" name="Google Shape;132;g7739f47d56_0_70:notes"/>
+          <p:cNvPr id="135" name="Google Shape;135;g7739f47d56_0_70:notes"/>
           <p:cNvSpPr/>
           <p:nvPr>
             <p:ph idx="2" type="sldImg"/>
@@ -1152,7 +1156,7 @@
       </p:sp>
       <p:sp>
         <p:nvSpPr>
-          <p:cNvPr id="133" name="Google Shape;133;g7739f47d56_0_70:notes"/>
+          <p:cNvPr id="136" name="Google Shape;136;g7739f47d56_0_70:notes"/>
           <p:cNvSpPr txBox="1"/>
           <p:nvPr>
             <p:ph idx="1" type="body"/>
@@ -1202,7 +1206,7 @@
   <p:cSld>
     <p:spTree>
       <p:nvGrpSpPr>
-        <p:cNvPr id="137" name="Shape 137"/>
+        <p:cNvPr id="140" name="Shape 140"/>
         <p:cNvGrpSpPr/>
         <p:nvPr/>
       </p:nvGrpSpPr>
@@ -1216,7 +1220,7 @@
       </p:grpSpPr>
       <p:sp>
         <p:nvSpPr>
-          <p:cNvPr id="138" name="Google Shape;138;g7739f47d56_0_77:notes"/>
+          <p:cNvPr id="141" name="Google Shape;141;g7739f47d56_0_77:notes"/>
           <p:cNvSpPr/>
           <p:nvPr>
             <p:ph idx="2" type="sldImg"/>
@@ -1251,7 +1255,7 @@
       </p:sp>
       <p:sp>
         <p:nvSpPr>
-          <p:cNvPr id="139" name="Google Shape;139;g7739f47d56_0_77:notes"/>
+          <p:cNvPr id="142" name="Google Shape;142;g7739f47d56_0_77:notes"/>
           <p:cNvSpPr txBox="1"/>
           <p:nvPr>
             <p:ph idx="1" type="body"/>
@@ -1301,7 +1305,7 @@
   <p:cSld>
     <p:spTree>
       <p:nvGrpSpPr>
-        <p:cNvPr id="144" name="Shape 144"/>
+        <p:cNvPr id="147" name="Shape 147"/>
         <p:cNvGrpSpPr/>
         <p:nvPr/>
       </p:nvGrpSpPr>
@@ -1315,7 +1319,7 @@
       </p:grpSpPr>
       <p:sp>
         <p:nvSpPr>
-          <p:cNvPr id="145" name="Google Shape;145;g7739f47d56_0_89:notes"/>
+          <p:cNvPr id="148" name="Google Shape;148;g7739f47d56_0_89:notes"/>
           <p:cNvSpPr/>
           <p:nvPr>
             <p:ph idx="2" type="sldImg"/>
@@ -1350,7 +1354,7 @@
       </p:sp>
       <p:sp>
         <p:nvSpPr>
-          <p:cNvPr id="146" name="Google Shape;146;g7739f47d56_0_89:notes"/>
+          <p:cNvPr id="149" name="Google Shape;149;g7739f47d56_0_89:notes"/>
           <p:cNvSpPr txBox="1"/>
           <p:nvPr>
             <p:ph idx="1" type="body"/>
@@ -1400,7 +1404,7 @@
   <p:cSld>
     <p:spTree>
       <p:nvGrpSpPr>
-        <p:cNvPr id="152" name="Shape 152"/>
+        <p:cNvPr id="155" name="Shape 155"/>
         <p:cNvGrpSpPr/>
         <p:nvPr/>
       </p:nvGrpSpPr>
@@ -1414,7 +1418,7 @@
       </p:grpSpPr>
       <p:sp>
         <p:nvSpPr>
-          <p:cNvPr id="153" name="Google Shape;153;g7739f47d56_0_100:notes"/>
+          <p:cNvPr id="156" name="Google Shape;156;g7739f47d56_0_95:notes"/>
           <p:cNvSpPr/>
           <p:nvPr>
             <p:ph idx="2" type="sldImg"/>
@@ -1449,7 +1453,7 @@
       </p:sp>
       <p:sp>
         <p:nvSpPr>
-          <p:cNvPr id="154" name="Google Shape;154;g7739f47d56_0_100:notes"/>
+          <p:cNvPr id="157" name="Google Shape;157;g7739f47d56_0_95:notes"/>
           <p:cNvSpPr txBox="1"/>
           <p:nvPr>
             <p:ph idx="1" type="body"/>
@@ -1499,7 +1503,7 @@
   <p:cSld>
     <p:spTree>
       <p:nvGrpSpPr>
-        <p:cNvPr id="158" name="Shape 158"/>
+        <p:cNvPr id="161" name="Shape 161"/>
         <p:cNvGrpSpPr/>
         <p:nvPr/>
       </p:nvGrpSpPr>
@@ -1513,7 +1517,7 @@
       </p:grpSpPr>
       <p:sp>
         <p:nvSpPr>
-          <p:cNvPr id="159" name="Google Shape;159;g7739f47d56_0_95:notes"/>
+          <p:cNvPr id="162" name="Google Shape;162;g7739f47d56_0_100:notes"/>
           <p:cNvSpPr/>
           <p:nvPr>
             <p:ph idx="2" type="sldImg"/>
@@ -1548,7 +1552,205 @@
       </p:sp>
       <p:sp>
         <p:nvSpPr>
-          <p:cNvPr id="160" name="Google Shape;160;g7739f47d56_0_95:notes"/>
+          <p:cNvPr id="163" name="Google Shape;163;g7739f47d56_0_100:notes"/>
+          <p:cNvSpPr txBox="1"/>
+          <p:nvPr>
+            <p:ph idx="1" type="body"/>
+          </p:nvPr>
+        </p:nvSpPr>
+        <p:spPr>
+          <a:xfrm>
+            <a:off x="685800" y="4343400"/>
+            <a:ext cx="5486400" cy="4114800"/>
+          </a:xfrm>
+          <a:prstGeom prst="rect">
+            <a:avLst/>
+          </a:prstGeom>
+        </p:spPr>
+        <p:txBody>
+          <a:bodyPr anchorCtr="0" anchor="t" bIns="91425" lIns="91425" spcFirstLastPara="1" rIns="91425" wrap="square" tIns="91425">
+            <a:noAutofit/>
+          </a:bodyPr>
+          <a:lstStyle/>
+          <a:p>
+            <a:pPr indent="0" lvl="0" marL="0" rtl="0" algn="l">
+              <a:spcBef>
+                <a:spcPts val="0"/>
+              </a:spcBef>
+              <a:spcAft>
+                <a:spcPts val="0"/>
+              </a:spcAft>
+              <a:buNone/>
+            </a:pPr>
+            <a:r>
+              <a:t/>
+            </a:r>
+            <a:endParaRPr/>
+          </a:p>
+        </p:txBody>
+      </p:sp>
+    </p:spTree>
+  </p:cSld>
+  <p:clrMapOvr>
+    <a:masterClrMapping/>
+  </p:clrMapOvr>
+</p:notes>
+</file>
+
+<file path=ppt/notesSlides/notesSlide18.xml><?xml version="1.0" encoding="utf-8"?>
+<p:notes xmlns:a="http://schemas.openxmlformats.org/drawingml/2006/main" xmlns:r="http://schemas.openxmlformats.org/officeDocument/2006/relationships" xmlns:mc="http://schemas.openxmlformats.org/markup-compatibility/2006" xmlns:mv="urn:schemas-microsoft-com:mac:vml" xmlns:p="http://schemas.openxmlformats.org/presentationml/2006/main" xmlns:c="http://schemas.openxmlformats.org/drawingml/2006/chart" xmlns:dgm="http://schemas.openxmlformats.org/drawingml/2006/diagram" xmlns:o="urn:schemas-microsoft-com:office:office" xmlns:v="urn:schemas-microsoft-com:vml" xmlns:pvml="urn:schemas-microsoft-com:office:powerpoint" xmlns:com="http://schemas.openxmlformats.org/drawingml/2006/compatibility" xmlns:p14="http://schemas.microsoft.com/office/powerpoint/2010/main" xmlns:p15="http://schemas.microsoft.com/office/powerpoint/2012/main" showMasterPhAnim="0" showMasterSp="0">
+  <p:cSld>
+    <p:spTree>
+      <p:nvGrpSpPr>
+        <p:cNvPr id="168" name="Shape 168"/>
+        <p:cNvGrpSpPr/>
+        <p:nvPr/>
+      </p:nvGrpSpPr>
+      <p:grpSpPr>
+        <a:xfrm>
+          <a:off x="0" y="0"/>
+          <a:ext cx="0" cy="0"/>
+          <a:chOff x="0" y="0"/>
+          <a:chExt cx="0" cy="0"/>
+        </a:xfrm>
+      </p:grpSpPr>
+      <p:sp>
+        <p:nvSpPr>
+          <p:cNvPr id="169" name="Google Shape;169;g7739f47d56_0_151:notes"/>
+          <p:cNvSpPr/>
+          <p:nvPr>
+            <p:ph idx="2" type="sldImg"/>
+          </p:nvPr>
+        </p:nvSpPr>
+        <p:spPr>
+          <a:xfrm>
+            <a:off x="381300" y="685800"/>
+            <a:ext cx="6096000" cy="3429000"/>
+          </a:xfrm>
+          <a:custGeom>
+            <a:rect b="b" l="l" r="r" t="t"/>
+            <a:pathLst>
+              <a:path extrusionOk="0" h="120000" w="120000">
+                <a:moveTo>
+                  <a:pt x="0" y="0"/>
+                </a:moveTo>
+                <a:lnTo>
+                  <a:pt x="120000" y="0"/>
+                </a:lnTo>
+                <a:lnTo>
+                  <a:pt x="120000" y="120000"/>
+                </a:lnTo>
+                <a:lnTo>
+                  <a:pt x="0" y="120000"/>
+                </a:lnTo>
+                <a:close/>
+              </a:path>
+            </a:pathLst>
+          </a:custGeom>
+        </p:spPr>
+      </p:sp>
+      <p:sp>
+        <p:nvSpPr>
+          <p:cNvPr id="170" name="Google Shape;170;g7739f47d56_0_151:notes"/>
+          <p:cNvSpPr txBox="1"/>
+          <p:nvPr>
+            <p:ph idx="1" type="body"/>
+          </p:nvPr>
+        </p:nvSpPr>
+        <p:spPr>
+          <a:xfrm>
+            <a:off x="685800" y="4343400"/>
+            <a:ext cx="5486400" cy="4114800"/>
+          </a:xfrm>
+          <a:prstGeom prst="rect">
+            <a:avLst/>
+          </a:prstGeom>
+        </p:spPr>
+        <p:txBody>
+          <a:bodyPr anchorCtr="0" anchor="t" bIns="91425" lIns="91425" spcFirstLastPara="1" rIns="91425" wrap="square" tIns="91425">
+            <a:noAutofit/>
+          </a:bodyPr>
+          <a:lstStyle/>
+          <a:p>
+            <a:pPr indent="0" lvl="0" marL="0" rtl="0" algn="l">
+              <a:spcBef>
+                <a:spcPts val="0"/>
+              </a:spcBef>
+              <a:spcAft>
+                <a:spcPts val="0"/>
+              </a:spcAft>
+              <a:buNone/>
+            </a:pPr>
+            <a:r>
+              <a:t/>
+            </a:r>
+            <a:endParaRPr/>
+          </a:p>
+        </p:txBody>
+      </p:sp>
+    </p:spTree>
+  </p:cSld>
+  <p:clrMapOvr>
+    <a:masterClrMapping/>
+  </p:clrMapOvr>
+</p:notes>
+</file>
+
+<file path=ppt/notesSlides/notesSlide19.xml><?xml version="1.0" encoding="utf-8"?>
+<p:notes xmlns:a="http://schemas.openxmlformats.org/drawingml/2006/main" xmlns:r="http://schemas.openxmlformats.org/officeDocument/2006/relationships" xmlns:mc="http://schemas.openxmlformats.org/markup-compatibility/2006" xmlns:mv="urn:schemas-microsoft-com:mac:vml" xmlns:p="http://schemas.openxmlformats.org/presentationml/2006/main" xmlns:c="http://schemas.openxmlformats.org/drawingml/2006/chart" xmlns:dgm="http://schemas.openxmlformats.org/drawingml/2006/diagram" xmlns:o="urn:schemas-microsoft-com:office:office" xmlns:v="urn:schemas-microsoft-com:vml" xmlns:pvml="urn:schemas-microsoft-com:office:powerpoint" xmlns:com="http://schemas.openxmlformats.org/drawingml/2006/compatibility" xmlns:p14="http://schemas.microsoft.com/office/powerpoint/2010/main" xmlns:p15="http://schemas.microsoft.com/office/powerpoint/2012/main" showMasterPhAnim="0" showMasterSp="0">
+  <p:cSld>
+    <p:spTree>
+      <p:nvGrpSpPr>
+        <p:cNvPr id="178" name="Shape 178"/>
+        <p:cNvGrpSpPr/>
+        <p:nvPr/>
+      </p:nvGrpSpPr>
+      <p:grpSpPr>
+        <a:xfrm>
+          <a:off x="0" y="0"/>
+          <a:ext cx="0" cy="0"/>
+          <a:chOff x="0" y="0"/>
+          <a:chExt cx="0" cy="0"/>
+        </a:xfrm>
+      </p:grpSpPr>
+      <p:sp>
+        <p:nvSpPr>
+          <p:cNvPr id="179" name="Google Shape;179;g7739f47d56_0_163:notes"/>
+          <p:cNvSpPr/>
+          <p:nvPr>
+            <p:ph idx="2" type="sldImg"/>
+          </p:nvPr>
+        </p:nvSpPr>
+        <p:spPr>
+          <a:xfrm>
+            <a:off x="381300" y="685800"/>
+            <a:ext cx="6096000" cy="3429000"/>
+          </a:xfrm>
+          <a:custGeom>
+            <a:rect b="b" l="l" r="r" t="t"/>
+            <a:pathLst>
+              <a:path extrusionOk="0" h="120000" w="120000">
+                <a:moveTo>
+                  <a:pt x="0" y="0"/>
+                </a:moveTo>
+                <a:lnTo>
+                  <a:pt x="120000" y="0"/>
+                </a:lnTo>
+                <a:lnTo>
+                  <a:pt x="120000" y="120000"/>
+                </a:lnTo>
+                <a:lnTo>
+                  <a:pt x="0" y="120000"/>
+                </a:lnTo>
+                <a:close/>
+              </a:path>
+            </a:pathLst>
+          </a:custGeom>
+        </p:spPr>
+      </p:sp>
+      <p:sp>
+        <p:nvSpPr>
+          <p:cNvPr id="180" name="Google Shape;180;g7739f47d56_0_163:notes"/>
           <p:cNvSpPr txBox="1"/>
           <p:nvPr>
             <p:ph idx="1" type="body"/>
@@ -1692,6 +1894,204 @@
 </p:notes>
 </file>
 
+<file path=ppt/notesSlides/notesSlide20.xml><?xml version="1.0" encoding="utf-8"?>
+<p:notes xmlns:a="http://schemas.openxmlformats.org/drawingml/2006/main" xmlns:r="http://schemas.openxmlformats.org/officeDocument/2006/relationships" xmlns:mc="http://schemas.openxmlformats.org/markup-compatibility/2006" xmlns:mv="urn:schemas-microsoft-com:mac:vml" xmlns:p="http://schemas.openxmlformats.org/presentationml/2006/main" xmlns:c="http://schemas.openxmlformats.org/drawingml/2006/chart" xmlns:dgm="http://schemas.openxmlformats.org/drawingml/2006/diagram" xmlns:o="urn:schemas-microsoft-com:office:office" xmlns:v="urn:schemas-microsoft-com:vml" xmlns:pvml="urn:schemas-microsoft-com:office:powerpoint" xmlns:com="http://schemas.openxmlformats.org/drawingml/2006/compatibility" xmlns:p14="http://schemas.microsoft.com/office/powerpoint/2010/main" xmlns:p15="http://schemas.microsoft.com/office/powerpoint/2012/main" showMasterPhAnim="0" showMasterSp="0">
+  <p:cSld>
+    <p:spTree>
+      <p:nvGrpSpPr>
+        <p:cNvPr id="188" name="Shape 188"/>
+        <p:cNvGrpSpPr/>
+        <p:nvPr/>
+      </p:nvGrpSpPr>
+      <p:grpSpPr>
+        <a:xfrm>
+          <a:off x="0" y="0"/>
+          <a:ext cx="0" cy="0"/>
+          <a:chOff x="0" y="0"/>
+          <a:chExt cx="0" cy="0"/>
+        </a:xfrm>
+      </p:grpSpPr>
+      <p:sp>
+        <p:nvSpPr>
+          <p:cNvPr id="189" name="Google Shape;189;g7739f47d56_0_144:notes"/>
+          <p:cNvSpPr/>
+          <p:nvPr>
+            <p:ph idx="2" type="sldImg"/>
+          </p:nvPr>
+        </p:nvSpPr>
+        <p:spPr>
+          <a:xfrm>
+            <a:off x="381300" y="685800"/>
+            <a:ext cx="6096000" cy="3429000"/>
+          </a:xfrm>
+          <a:custGeom>
+            <a:rect b="b" l="l" r="r" t="t"/>
+            <a:pathLst>
+              <a:path extrusionOk="0" h="120000" w="120000">
+                <a:moveTo>
+                  <a:pt x="0" y="0"/>
+                </a:moveTo>
+                <a:lnTo>
+                  <a:pt x="120000" y="0"/>
+                </a:lnTo>
+                <a:lnTo>
+                  <a:pt x="120000" y="120000"/>
+                </a:lnTo>
+                <a:lnTo>
+                  <a:pt x="0" y="120000"/>
+                </a:lnTo>
+                <a:close/>
+              </a:path>
+            </a:pathLst>
+          </a:custGeom>
+        </p:spPr>
+      </p:sp>
+      <p:sp>
+        <p:nvSpPr>
+          <p:cNvPr id="190" name="Google Shape;190;g7739f47d56_0_144:notes"/>
+          <p:cNvSpPr txBox="1"/>
+          <p:nvPr>
+            <p:ph idx="1" type="body"/>
+          </p:nvPr>
+        </p:nvSpPr>
+        <p:spPr>
+          <a:xfrm>
+            <a:off x="685800" y="4343400"/>
+            <a:ext cx="5486400" cy="4114800"/>
+          </a:xfrm>
+          <a:prstGeom prst="rect">
+            <a:avLst/>
+          </a:prstGeom>
+        </p:spPr>
+        <p:txBody>
+          <a:bodyPr anchorCtr="0" anchor="t" bIns="91425" lIns="91425" spcFirstLastPara="1" rIns="91425" wrap="square" tIns="91425">
+            <a:noAutofit/>
+          </a:bodyPr>
+          <a:lstStyle/>
+          <a:p>
+            <a:pPr indent="0" lvl="0" marL="0" rtl="0" algn="l">
+              <a:spcBef>
+                <a:spcPts val="0"/>
+              </a:spcBef>
+              <a:spcAft>
+                <a:spcPts val="0"/>
+              </a:spcAft>
+              <a:buNone/>
+            </a:pPr>
+            <a:r>
+              <a:t/>
+            </a:r>
+            <a:endParaRPr/>
+          </a:p>
+        </p:txBody>
+      </p:sp>
+    </p:spTree>
+  </p:cSld>
+  <p:clrMapOvr>
+    <a:masterClrMapping/>
+  </p:clrMapOvr>
+</p:notes>
+</file>
+
+<file path=ppt/notesSlides/notesSlide21.xml><?xml version="1.0" encoding="utf-8"?>
+<p:notes xmlns:a="http://schemas.openxmlformats.org/drawingml/2006/main" xmlns:r="http://schemas.openxmlformats.org/officeDocument/2006/relationships" xmlns:mc="http://schemas.openxmlformats.org/markup-compatibility/2006" xmlns:mv="urn:schemas-microsoft-com:mac:vml" xmlns:p="http://schemas.openxmlformats.org/presentationml/2006/main" xmlns:c="http://schemas.openxmlformats.org/drawingml/2006/chart" xmlns:dgm="http://schemas.openxmlformats.org/drawingml/2006/diagram" xmlns:o="urn:schemas-microsoft-com:office:office" xmlns:v="urn:schemas-microsoft-com:vml" xmlns:pvml="urn:schemas-microsoft-com:office:powerpoint" xmlns:com="http://schemas.openxmlformats.org/drawingml/2006/compatibility" xmlns:p14="http://schemas.microsoft.com/office/powerpoint/2010/main" xmlns:p15="http://schemas.microsoft.com/office/powerpoint/2012/main" showMasterPhAnim="0" showMasterSp="0">
+  <p:cSld>
+    <p:spTree>
+      <p:nvGrpSpPr>
+        <p:cNvPr id="198" name="Shape 198"/>
+        <p:cNvGrpSpPr/>
+        <p:nvPr/>
+      </p:nvGrpSpPr>
+      <p:grpSpPr>
+        <a:xfrm>
+          <a:off x="0" y="0"/>
+          <a:ext cx="0" cy="0"/>
+          <a:chOff x="0" y="0"/>
+          <a:chExt cx="0" cy="0"/>
+        </a:xfrm>
+      </p:grpSpPr>
+      <p:sp>
+        <p:nvSpPr>
+          <p:cNvPr id="199" name="Google Shape;199;g775cf68eb9_3_2:notes"/>
+          <p:cNvSpPr/>
+          <p:nvPr>
+            <p:ph idx="2" type="sldImg"/>
+          </p:nvPr>
+        </p:nvSpPr>
+        <p:spPr>
+          <a:xfrm>
+            <a:off x="381300" y="685800"/>
+            <a:ext cx="6096000" cy="3429000"/>
+          </a:xfrm>
+          <a:custGeom>
+            <a:rect b="b" l="l" r="r" t="t"/>
+            <a:pathLst>
+              <a:path extrusionOk="0" h="120000" w="120000">
+                <a:moveTo>
+                  <a:pt x="0" y="0"/>
+                </a:moveTo>
+                <a:lnTo>
+                  <a:pt x="120000" y="0"/>
+                </a:lnTo>
+                <a:lnTo>
+                  <a:pt x="120000" y="120000"/>
+                </a:lnTo>
+                <a:lnTo>
+                  <a:pt x="0" y="120000"/>
+                </a:lnTo>
+                <a:close/>
+              </a:path>
+            </a:pathLst>
+          </a:custGeom>
+        </p:spPr>
+      </p:sp>
+      <p:sp>
+        <p:nvSpPr>
+          <p:cNvPr id="200" name="Google Shape;200;g775cf68eb9_3_2:notes"/>
+          <p:cNvSpPr txBox="1"/>
+          <p:nvPr>
+            <p:ph idx="1" type="body"/>
+          </p:nvPr>
+        </p:nvSpPr>
+        <p:spPr>
+          <a:xfrm>
+            <a:off x="685800" y="4343400"/>
+            <a:ext cx="5486400" cy="4114800"/>
+          </a:xfrm>
+          <a:prstGeom prst="rect">
+            <a:avLst/>
+          </a:prstGeom>
+        </p:spPr>
+        <p:txBody>
+          <a:bodyPr anchorCtr="0" anchor="t" bIns="91425" lIns="91425" spcFirstLastPara="1" rIns="91425" wrap="square" tIns="91425">
+            <a:noAutofit/>
+          </a:bodyPr>
+          <a:lstStyle/>
+          <a:p>
+            <a:pPr indent="0" lvl="0" marL="0" rtl="0" algn="l">
+              <a:spcBef>
+                <a:spcPts val="0"/>
+              </a:spcBef>
+              <a:spcAft>
+                <a:spcPts val="0"/>
+              </a:spcAft>
+              <a:buNone/>
+            </a:pPr>
+            <a:r>
+              <a:t/>
+            </a:r>
+            <a:endParaRPr/>
+          </a:p>
+        </p:txBody>
+      </p:sp>
+    </p:spTree>
+  </p:cSld>
+  <p:clrMapOvr>
+    <a:masterClrMapping/>
+  </p:clrMapOvr>
+</p:notes>
+</file>
+
 <file path=ppt/notesSlides/notesSlide3.xml><?xml version="1.0" encoding="utf-8"?>
 <p:notes xmlns:a="http://schemas.openxmlformats.org/drawingml/2006/main" xmlns:r="http://schemas.openxmlformats.org/officeDocument/2006/relationships" xmlns:mc="http://schemas.openxmlformats.org/markup-compatibility/2006" xmlns:mv="urn:schemas-microsoft-com:mac:vml" xmlns:p="http://schemas.openxmlformats.org/presentationml/2006/main" xmlns:c="http://schemas.openxmlformats.org/drawingml/2006/chart" xmlns:dgm="http://schemas.openxmlformats.org/drawingml/2006/diagram" xmlns:o="urn:schemas-microsoft-com:office:office" xmlns:v="urn:schemas-microsoft-com:vml" xmlns:pvml="urn:schemas-microsoft-com:office:powerpoint" xmlns:com="http://schemas.openxmlformats.org/drawingml/2006/compatibility" xmlns:p14="http://schemas.microsoft.com/office/powerpoint/2010/main" xmlns:p15="http://schemas.microsoft.com/office/powerpoint/2012/main" showMasterPhAnim="0" showMasterSp="0">
   <p:cSld>
@@ -1909,7 +2309,7 @@
       </p:grpSpPr>
       <p:sp>
         <p:nvSpPr>
-          <p:cNvPr id="76" name="Google Shape;76;g7739f47d56_0_27:notes"/>
+          <p:cNvPr id="76" name="Google Shape;76;g7739f47d56_0_34:notes"/>
           <p:cNvSpPr/>
           <p:nvPr>
             <p:ph idx="2" type="sldImg"/>
@@ -1944,7 +2344,7 @@
       </p:sp>
       <p:sp>
         <p:nvSpPr>
-          <p:cNvPr id="77" name="Google Shape;77;g7739f47d56_0_27:notes"/>
+          <p:cNvPr id="77" name="Google Shape;77;g7739f47d56_0_34:notes"/>
           <p:cNvSpPr txBox="1"/>
           <p:nvPr>
             <p:ph idx="1" type="body"/>
@@ -2008,7 +2408,7 @@
       </p:grpSpPr>
       <p:sp>
         <p:nvSpPr>
-          <p:cNvPr id="82" name="Google Shape;82;g7739f47d56_0_34:notes"/>
+          <p:cNvPr id="82" name="Google Shape;82;g7739f47d56_0_41:notes"/>
           <p:cNvSpPr/>
           <p:nvPr>
             <p:ph idx="2" type="sldImg"/>
@@ -2043,7 +2443,7 @@
       </p:sp>
       <p:sp>
         <p:nvSpPr>
-          <p:cNvPr id="83" name="Google Shape;83;g7739f47d56_0_34:notes"/>
+          <p:cNvPr id="83" name="Google Shape;83;g7739f47d56_0_41:notes"/>
           <p:cNvSpPr txBox="1"/>
           <p:nvPr>
             <p:ph idx="1" type="body"/>
@@ -2093,7 +2493,7 @@
   <p:cSld>
     <p:spTree>
       <p:nvGrpSpPr>
-        <p:cNvPr id="87" name="Shape 87"/>
+        <p:cNvPr id="90" name="Shape 90"/>
         <p:cNvGrpSpPr/>
         <p:nvPr/>
       </p:nvGrpSpPr>
@@ -2107,7 +2507,7 @@
       </p:grpSpPr>
       <p:sp>
         <p:nvSpPr>
-          <p:cNvPr id="88" name="Google Shape;88;g7739f47d56_0_41:notes"/>
+          <p:cNvPr id="91" name="Google Shape;91;g7739f47d56_0_53:notes"/>
           <p:cNvSpPr/>
           <p:nvPr>
             <p:ph idx="2" type="sldImg"/>
@@ -2142,7 +2542,7 @@
       </p:sp>
       <p:sp>
         <p:nvSpPr>
-          <p:cNvPr id="89" name="Google Shape;89;g7739f47d56_0_41:notes"/>
+          <p:cNvPr id="92" name="Google Shape;92;g7739f47d56_0_53:notes"/>
           <p:cNvSpPr txBox="1"/>
           <p:nvPr>
             <p:ph idx="1" type="body"/>
@@ -2206,7 +2606,7 @@
       </p:grpSpPr>
       <p:sp>
         <p:nvSpPr>
-          <p:cNvPr id="97" name="Google Shape;97;g7739f47d56_0_53:notes"/>
+          <p:cNvPr id="97" name="Google Shape;97;g775cf68eb9_1_0:notes"/>
           <p:cNvSpPr/>
           <p:nvPr>
             <p:ph idx="2" type="sldImg"/>
@@ -2241,7 +2641,7 @@
       </p:sp>
       <p:sp>
         <p:nvSpPr>
-          <p:cNvPr id="98" name="Google Shape;98;g7739f47d56_0_53:notes"/>
+          <p:cNvPr id="98" name="Google Shape;98;g775cf68eb9_1_0:notes"/>
           <p:cNvSpPr txBox="1"/>
           <p:nvPr>
             <p:ph idx="1" type="body"/>
@@ -2291,7 +2691,7 @@
   <p:cSld>
     <p:spTree>
       <p:nvGrpSpPr>
-        <p:cNvPr id="102" name="Shape 102"/>
+        <p:cNvPr id="105" name="Shape 105"/>
         <p:cNvGrpSpPr/>
         <p:nvPr/>
       </p:nvGrpSpPr>
@@ -2305,7 +2705,7 @@
       </p:grpSpPr>
       <p:sp>
         <p:nvSpPr>
-          <p:cNvPr id="103" name="Google Shape;103;g7739f47d56_0_46:notes"/>
+          <p:cNvPr id="106" name="Google Shape;106;g7739f47d56_0_46:notes"/>
           <p:cNvSpPr/>
           <p:nvPr>
             <p:ph idx="2" type="sldImg"/>
@@ -2340,7 +2740,7 @@
       </p:sp>
       <p:sp>
         <p:nvSpPr>
-          <p:cNvPr id="104" name="Google Shape;104;g7739f47d56_0_46:notes"/>
+          <p:cNvPr id="107" name="Google Shape;107;g7739f47d56_0_46:notes"/>
           <p:cNvSpPr txBox="1"/>
           <p:nvPr>
             <p:ph idx="1" type="body"/>
@@ -7061,8 +7461,8 @@
         </p:nvSpPr>
         <p:spPr>
           <a:xfrm>
-            <a:off x="311708" y="744575"/>
-            <a:ext cx="8520600" cy="2052600"/>
+            <a:off x="104525" y="898500"/>
+            <a:ext cx="8520600" cy="933000"/>
           </a:xfrm>
           <a:prstGeom prst="rect">
             <a:avLst/>
@@ -7101,7 +7501,7 @@
         </p:nvSpPr>
         <p:spPr>
           <a:xfrm>
-            <a:off x="311700" y="2834125"/>
+            <a:off x="311700" y="2175450"/>
             <a:ext cx="8520600" cy="792600"/>
           </a:xfrm>
           <a:prstGeom prst="rect">
@@ -7186,7 +7586,7 @@
   <p:cSld>
     <p:spTree>
       <p:nvGrpSpPr>
-        <p:cNvPr id="111" name="Shape 111"/>
+        <p:cNvPr id="114" name="Shape 114"/>
         <p:cNvGrpSpPr/>
         <p:nvPr/>
       </p:nvGrpSpPr>
@@ -7200,7 +7600,7 @@
       </p:grpSpPr>
       <p:sp>
         <p:nvSpPr>
-          <p:cNvPr id="112" name="Google Shape;112;p22"/>
+          <p:cNvPr id="115" name="Google Shape;115;p22"/>
           <p:cNvSpPr txBox="1"/>
           <p:nvPr>
             <p:ph type="title"/>
@@ -7240,7 +7640,7 @@
       </p:sp>
       <p:sp>
         <p:nvSpPr>
-          <p:cNvPr id="113" name="Google Shape;113;p22"/>
+          <p:cNvPr id="116" name="Google Shape;116;p22"/>
           <p:cNvSpPr txBox="1"/>
           <p:nvPr>
             <p:ph idx="1" type="body"/>
@@ -7274,14 +7674,14 @@
               <a:buNone/>
             </a:pPr>
             <a:r>
-              <a:rPr lang="en" sz="2200">
+              <a:rPr b="1" lang="en" sz="2400">
                 <a:solidFill>
                   <a:schemeClr val="dk1"/>
                 </a:solidFill>
               </a:rPr>
-              <a:t>•Training</a:t>
-            </a:r>
-            <a:endParaRPr sz="1100">
+              <a:t>Training</a:t>
+            </a:r>
+            <a:endParaRPr b="1" sz="1300">
               <a:solidFill>
                 <a:schemeClr val="dk1"/>
               </a:solidFill>
@@ -7336,7 +7736,7 @@
       </p:sp>
       <p:pic>
         <p:nvPicPr>
-          <p:cNvPr id="114" name="Google Shape;114;p22"/>
+          <p:cNvPr id="117" name="Google Shape;117;p22"/>
           <p:cNvPicPr preferRelativeResize="0"/>
           <p:nvPr/>
         </p:nvPicPr>
@@ -7364,7 +7764,7 @@
       </p:pic>
       <p:pic>
         <p:nvPicPr>
-          <p:cNvPr id="115" name="Google Shape;115;p22"/>
+          <p:cNvPr id="118" name="Google Shape;118;p22"/>
           <p:cNvPicPr preferRelativeResize="0"/>
           <p:nvPr/>
         </p:nvPicPr>
@@ -7377,8 +7777,8 @@
         </p:blipFill>
         <p:spPr>
           <a:xfrm>
-            <a:off x="4458650" y="1348700"/>
-            <a:ext cx="3650026" cy="3650024"/>
+            <a:off x="4458650" y="1459375"/>
+            <a:ext cx="3273950" cy="3273950"/>
           </a:xfrm>
           <a:prstGeom prst="rect">
             <a:avLst/>
@@ -7402,7 +7802,7 @@
   <p:cSld>
     <p:spTree>
       <p:nvGrpSpPr>
-        <p:cNvPr id="119" name="Shape 119"/>
+        <p:cNvPr id="122" name="Shape 122"/>
         <p:cNvGrpSpPr/>
         <p:nvPr/>
       </p:nvGrpSpPr>
@@ -7416,7 +7816,7 @@
       </p:grpSpPr>
       <p:sp>
         <p:nvSpPr>
-          <p:cNvPr id="120" name="Google Shape;120;p23"/>
+          <p:cNvPr id="123" name="Google Shape;123;p23"/>
           <p:cNvSpPr txBox="1"/>
           <p:nvPr>
             <p:ph type="title"/>
@@ -7456,7 +7856,7 @@
       </p:sp>
       <p:sp>
         <p:nvSpPr>
-          <p:cNvPr id="121" name="Google Shape;121;p23"/>
+          <p:cNvPr id="124" name="Google Shape;124;p23"/>
           <p:cNvSpPr txBox="1"/>
           <p:nvPr>
             <p:ph idx="1" type="body"/>
@@ -7465,7 +7865,7 @@
         <p:spPr>
           <a:xfrm>
             <a:off x="91675" y="573425"/>
-            <a:ext cx="8795400" cy="3179400"/>
+            <a:ext cx="8795400" cy="1184400"/>
           </a:xfrm>
           <a:prstGeom prst="rect">
             <a:avLst/>
@@ -7490,14 +7890,14 @@
               <a:buNone/>
             </a:pPr>
             <a:r>
-              <a:rPr lang="en" sz="2200">
+              <a:rPr b="1" lang="en" sz="2400">
                 <a:solidFill>
                   <a:schemeClr val="dk1"/>
                 </a:solidFill>
               </a:rPr>
-              <a:t>•Training</a:t>
-            </a:r>
-            <a:endParaRPr sz="1100">
+              <a:t>Training</a:t>
+            </a:r>
+            <a:endParaRPr b="1" sz="1300">
               <a:solidFill>
                 <a:schemeClr val="dk1"/>
               </a:solidFill>
@@ -7533,7 +7933,7 @@
                   <a:schemeClr val="dk1"/>
                 </a:solidFill>
               </a:rPr>
-              <a:t>Output of final version of electronic and psychedelic genres</a:t>
+              <a:t>Output of final version of electronic genre</a:t>
             </a:r>
             <a:endParaRPr b="1" sz="1100">
               <a:solidFill>
@@ -7582,7 +7982,7 @@
       </p:sp>
       <p:pic>
         <p:nvPicPr>
-          <p:cNvPr id="122" name="Google Shape;122;p23"/>
+          <p:cNvPr id="125" name="Google Shape;125;p23"/>
           <p:cNvPicPr preferRelativeResize="0"/>
           <p:nvPr/>
         </p:nvPicPr>
@@ -7610,7 +8010,7 @@
       </p:pic>
       <p:pic>
         <p:nvPicPr>
-          <p:cNvPr id="123" name="Google Shape;123;p23"/>
+          <p:cNvPr id="126" name="Google Shape;126;p23"/>
           <p:cNvPicPr preferRelativeResize="0"/>
           <p:nvPr/>
         </p:nvPicPr>
@@ -7638,7 +8038,7 @@
       </p:pic>
       <p:sp>
         <p:nvSpPr>
-          <p:cNvPr id="124" name="Google Shape;124;p23"/>
+          <p:cNvPr id="127" name="Google Shape;127;p23"/>
           <p:cNvSpPr txBox="1"/>
           <p:nvPr/>
         </p:nvSpPr>
@@ -7695,7 +8095,7 @@
   <p:cSld>
     <p:spTree>
       <p:nvGrpSpPr>
-        <p:cNvPr id="128" name="Shape 128"/>
+        <p:cNvPr id="131" name="Shape 131"/>
         <p:cNvGrpSpPr/>
         <p:nvPr/>
       </p:nvGrpSpPr>
@@ -7709,7 +8109,7 @@
       </p:grpSpPr>
       <p:sp>
         <p:nvSpPr>
-          <p:cNvPr id="129" name="Google Shape;129;p24"/>
+          <p:cNvPr id="132" name="Google Shape;132;p24"/>
           <p:cNvSpPr txBox="1"/>
           <p:nvPr>
             <p:ph type="title"/>
@@ -7749,7 +8149,7 @@
       </p:sp>
       <p:sp>
         <p:nvSpPr>
-          <p:cNvPr id="130" name="Google Shape;130;p24"/>
+          <p:cNvPr id="133" name="Google Shape;133;p24"/>
           <p:cNvSpPr txBox="1"/>
           <p:nvPr>
             <p:ph idx="1" type="body"/>
@@ -7783,12 +8183,48 @@
               <a:buNone/>
             </a:pPr>
             <a:r>
+              <a:rPr b="1" lang="en" sz="2400">
+                <a:solidFill>
+                  <a:schemeClr val="dk1"/>
+                </a:solidFill>
+              </a:rPr>
+              <a:t>Training Results</a:t>
+            </a:r>
+            <a:endParaRPr b="1" sz="2400">
+              <a:solidFill>
+                <a:schemeClr val="dk1"/>
+              </a:solidFill>
+            </a:endParaRPr>
+          </a:p>
+          <a:p>
+            <a:pPr indent="457200" lvl="0" marL="0" rtl="0" algn="l">
+              <a:lnSpc>
+                <a:spcPct val="90000"/>
+              </a:lnSpc>
+              <a:spcBef>
+                <a:spcPts val="1000"/>
+              </a:spcBef>
+              <a:spcAft>
+                <a:spcPts val="0"/>
+              </a:spcAft>
+              <a:buNone/>
+            </a:pPr>
+            <a:r>
               <a:rPr lang="en" sz="2200">
                 <a:solidFill>
                   <a:schemeClr val="dk1"/>
                 </a:solidFill>
               </a:rPr>
-              <a:t>•Training</a:t>
+              <a:t>EDM training: </a:t>
+            </a:r>
+            <a:r>
+              <a:rPr lang="en" sz="2200" u="sng">
+                <a:solidFill>
+                  <a:schemeClr val="hlink"/>
+                </a:solidFill>
+                <a:hlinkClick r:id="rId3"/>
+              </a:rPr>
+              <a:t>https://imgur.com/XGrmRR1</a:t>
             </a:r>
             <a:endParaRPr sz="2200">
               <a:solidFill>
@@ -7797,43 +8233,7 @@
             </a:endParaRPr>
           </a:p>
           <a:p>
-            <a:pPr indent="0" lvl="0" marL="0" rtl="0" algn="l">
-              <a:lnSpc>
-                <a:spcPct val="90000"/>
-              </a:lnSpc>
-              <a:spcBef>
-                <a:spcPts val="1000"/>
-              </a:spcBef>
-              <a:spcAft>
-                <a:spcPts val="0"/>
-              </a:spcAft>
-              <a:buNone/>
-            </a:pPr>
-            <a:r>
-              <a:rPr lang="en" sz="2200">
-                <a:solidFill>
-                  <a:schemeClr val="dk1"/>
-                </a:solidFill>
-              </a:rPr>
-              <a:t>EDM training: </a:t>
-            </a:r>
-            <a:r>
-              <a:rPr lang="en" sz="2200" u="sng">
-                <a:solidFill>
-                  <a:schemeClr val="hlink"/>
-                </a:solidFill>
-                <a:hlinkClick r:id="rId3"/>
-              </a:rPr>
-              <a:t>https://imgur.com/XGrmRR1</a:t>
-            </a:r>
-            <a:endParaRPr sz="2200">
-              <a:solidFill>
-                <a:schemeClr val="dk1"/>
-              </a:solidFill>
-            </a:endParaRPr>
-          </a:p>
-          <a:p>
-            <a:pPr indent="0" lvl="0" marL="0" rtl="0" algn="l">
+            <a:pPr indent="457200" lvl="0" marL="0" rtl="0" algn="l">
               <a:lnSpc>
                 <a:spcPct val="90000"/>
               </a:lnSpc>
@@ -7942,7 +8342,7 @@
   <p:cSld>
     <p:spTree>
       <p:nvGrpSpPr>
-        <p:cNvPr id="134" name="Shape 134"/>
+        <p:cNvPr id="137" name="Shape 137"/>
         <p:cNvGrpSpPr/>
         <p:nvPr/>
       </p:nvGrpSpPr>
@@ -7956,7 +8356,7 @@
       </p:grpSpPr>
       <p:sp>
         <p:nvSpPr>
-          <p:cNvPr id="135" name="Google Shape;135;p25"/>
+          <p:cNvPr id="138" name="Google Shape;138;p25"/>
           <p:cNvSpPr txBox="1"/>
           <p:nvPr>
             <p:ph type="title"/>
@@ -7996,7 +8396,7 @@
       </p:sp>
       <p:sp>
         <p:nvSpPr>
-          <p:cNvPr id="136" name="Google Shape;136;p25"/>
+          <p:cNvPr id="139" name="Google Shape;139;p25"/>
           <p:cNvSpPr txBox="1"/>
           <p:nvPr>
             <p:ph idx="1" type="body"/>
@@ -8004,7 +8404,7 @@
         </p:nvSpPr>
         <p:spPr>
           <a:xfrm>
-            <a:off x="91675" y="573425"/>
+            <a:off x="174300" y="684100"/>
             <a:ext cx="8795400" cy="3179400"/>
           </a:xfrm>
           <a:prstGeom prst="rect">
@@ -8030,14 +8430,14 @@
               <a:buNone/>
             </a:pPr>
             <a:r>
-              <a:rPr lang="en" sz="2200">
+              <a:rPr b="1" lang="en" sz="2400">
                 <a:solidFill>
                   <a:schemeClr val="dk1"/>
                 </a:solidFill>
               </a:rPr>
-              <a:t>•Inference</a:t>
-            </a:r>
-            <a:endParaRPr sz="2200">
+              <a:t>Inference</a:t>
+            </a:r>
+            <a:endParaRPr b="1" sz="2400">
               <a:solidFill>
                 <a:schemeClr val="dk1"/>
               </a:solidFill>
@@ -8173,7 +8573,7 @@
   <p:cSld>
     <p:spTree>
       <p:nvGrpSpPr>
-        <p:cNvPr id="140" name="Shape 140"/>
+        <p:cNvPr id="143" name="Shape 143"/>
         <p:cNvGrpSpPr/>
         <p:nvPr/>
       </p:nvGrpSpPr>
@@ -8187,7 +8587,7 @@
       </p:grpSpPr>
       <p:sp>
         <p:nvSpPr>
-          <p:cNvPr id="141" name="Google Shape;141;p26"/>
+          <p:cNvPr id="144" name="Google Shape;144;p26"/>
           <p:cNvSpPr txBox="1"/>
           <p:nvPr>
             <p:ph type="title"/>
@@ -8227,7 +8627,7 @@
       </p:sp>
       <p:sp>
         <p:nvSpPr>
-          <p:cNvPr id="142" name="Google Shape;142;p26"/>
+          <p:cNvPr id="145" name="Google Shape;145;p26"/>
           <p:cNvSpPr txBox="1"/>
           <p:nvPr>
             <p:ph idx="1" type="body"/>
@@ -8235,7 +8635,7 @@
         </p:nvSpPr>
         <p:spPr>
           <a:xfrm>
-            <a:off x="91675" y="573425"/>
+            <a:off x="143750" y="579950"/>
             <a:ext cx="8795400" cy="3179400"/>
           </a:xfrm>
           <a:prstGeom prst="rect">
@@ -8261,14 +8661,14 @@
               <a:buNone/>
             </a:pPr>
             <a:r>
-              <a:rPr lang="en" sz="2200">
+              <a:rPr b="1" lang="en" sz="2400">
                 <a:solidFill>
                   <a:schemeClr val="dk1"/>
                 </a:solidFill>
               </a:rPr>
-              <a:t>•Architecture</a:t>
-            </a:r>
-            <a:endParaRPr sz="2200">
+              <a:t>Architecture</a:t>
+            </a:r>
+            <a:endParaRPr b="1" sz="2400">
               <a:solidFill>
                 <a:schemeClr val="dk1"/>
               </a:solidFill>
@@ -8428,7 +8828,7 @@
       </p:sp>
       <p:pic>
         <p:nvPicPr>
-          <p:cNvPr id="143" name="Google Shape;143;p26"/>
+          <p:cNvPr id="146" name="Google Shape;146;p26"/>
           <p:cNvPicPr preferRelativeResize="0"/>
           <p:nvPr/>
         </p:nvPicPr>
@@ -8442,7 +8842,7 @@
         </p:blipFill>
         <p:spPr>
           <a:xfrm>
-            <a:off x="483625" y="1678775"/>
+            <a:off x="477125" y="1893625"/>
             <a:ext cx="7694474" cy="3135051"/>
           </a:xfrm>
           <a:prstGeom prst="rect">
@@ -8467,7 +8867,7 @@
   <p:cSld>
     <p:spTree>
       <p:nvGrpSpPr>
-        <p:cNvPr id="147" name="Shape 147"/>
+        <p:cNvPr id="150" name="Shape 150"/>
         <p:cNvGrpSpPr/>
         <p:nvPr/>
       </p:nvGrpSpPr>
@@ -8481,7 +8881,7 @@
       </p:grpSpPr>
       <p:sp>
         <p:nvSpPr>
-          <p:cNvPr id="148" name="Google Shape;148;p27"/>
+          <p:cNvPr id="151" name="Google Shape;151;p27"/>
           <p:cNvSpPr txBox="1"/>
           <p:nvPr>
             <p:ph type="title"/>
@@ -8521,7 +8921,7 @@
       </p:sp>
       <p:sp>
         <p:nvSpPr>
-          <p:cNvPr id="149" name="Google Shape;149;p27"/>
+          <p:cNvPr id="152" name="Google Shape;152;p27"/>
           <p:cNvSpPr txBox="1"/>
           <p:nvPr>
             <p:ph idx="1" type="body"/>
@@ -8555,12 +8955,91 @@
               <a:buNone/>
             </a:pPr>
             <a:r>
+              <a:rPr b="1" lang="en" sz="2400">
+                <a:solidFill>
+                  <a:schemeClr val="dk1"/>
+                </a:solidFill>
+              </a:rPr>
+              <a:t>User interface</a:t>
+            </a:r>
+            <a:endParaRPr b="1" sz="2400">
+              <a:solidFill>
+                <a:schemeClr val="dk1"/>
+              </a:solidFill>
+            </a:endParaRPr>
+          </a:p>
+          <a:p>
+            <a:pPr indent="0" lvl="0" marL="0" rtl="0" algn="l">
+              <a:lnSpc>
+                <a:spcPct val="90000"/>
+              </a:lnSpc>
+              <a:spcBef>
+                <a:spcPts val="1000"/>
+              </a:spcBef>
+              <a:spcAft>
+                <a:spcPts val="0"/>
+              </a:spcAft>
+              <a:buNone/>
+            </a:pPr>
+            <a:r>
               <a:rPr lang="en" sz="2200">
                 <a:solidFill>
                   <a:schemeClr val="dk1"/>
                 </a:solidFill>
               </a:rPr>
-              <a:t>•User interface</a:t>
+              <a:t>	</a:t>
+            </a:r>
+            <a:r>
+              <a:rPr lang="en" sz="1400">
+                <a:solidFill>
+                  <a:schemeClr val="dk1"/>
+                </a:solidFill>
+              </a:rPr>
+              <a:t>Is a static html page with a flask wrapper which uses GET and POST functionality in order to </a:t>
+            </a:r>
+            <a:r>
+              <a:rPr lang="en" sz="1400">
+                <a:solidFill>
+                  <a:schemeClr val="dk1"/>
+                </a:solidFill>
+              </a:rPr>
+              <a:t>utilize</a:t>
+            </a:r>
+            <a:r>
+              <a:rPr lang="en" sz="1400">
+                <a:solidFill>
+                  <a:schemeClr val="dk1"/>
+                </a:solidFill>
+              </a:rPr>
+              <a:t> the driver code.</a:t>
+            </a:r>
+            <a:endParaRPr sz="1400">
+              <a:solidFill>
+                <a:schemeClr val="dk1"/>
+              </a:solidFill>
+            </a:endParaRPr>
+          </a:p>
+          <a:p>
+            <a:pPr indent="0" lvl="0" marL="0" rtl="0" algn="l">
+              <a:lnSpc>
+                <a:spcPct val="90000"/>
+              </a:lnSpc>
+              <a:spcBef>
+                <a:spcPts val="1000"/>
+              </a:spcBef>
+              <a:spcAft>
+                <a:spcPts val="0"/>
+              </a:spcAft>
+              <a:buNone/>
+            </a:pPr>
+            <a:r>
+              <a:rPr lang="en" sz="1100" u="sng">
+                <a:solidFill>
+                  <a:schemeClr val="hlink"/>
+                </a:solidFill>
+                <a:hlinkClick r:id="rId3"/>
+              </a:rPr>
+              <a:t>https://sunlit-mix-274903.wl.r.appspot.com/</a:t>
             </a:r>
             <a:endParaRPr sz="2200">
               <a:solidFill>
@@ -8570,85 +9049,6 @@
           </a:p>
           <a:p>
             <a:pPr indent="0" lvl="0" marL="0" rtl="0" algn="l">
-              <a:lnSpc>
-                <a:spcPct val="90000"/>
-              </a:lnSpc>
-              <a:spcBef>
-                <a:spcPts val="1000"/>
-              </a:spcBef>
-              <a:spcAft>
-                <a:spcPts val="0"/>
-              </a:spcAft>
-              <a:buNone/>
-            </a:pPr>
-            <a:r>
-              <a:rPr lang="en" sz="2200">
-                <a:solidFill>
-                  <a:schemeClr val="dk1"/>
-                </a:solidFill>
-              </a:rPr>
-              <a:t>	</a:t>
-            </a:r>
-            <a:r>
-              <a:rPr lang="en" sz="1400">
-                <a:solidFill>
-                  <a:schemeClr val="dk1"/>
-                </a:solidFill>
-              </a:rPr>
-              <a:t>Is a static html page with a flask wrapper which uses GET and POST functionality in order to </a:t>
-            </a:r>
-            <a:r>
-              <a:rPr lang="en" sz="1400">
-                <a:solidFill>
-                  <a:schemeClr val="dk1"/>
-                </a:solidFill>
-              </a:rPr>
-              <a:t>utilize</a:t>
-            </a:r>
-            <a:r>
-              <a:rPr lang="en" sz="1400">
-                <a:solidFill>
-                  <a:schemeClr val="dk1"/>
-                </a:solidFill>
-              </a:rPr>
-              <a:t> the driver code.</a:t>
-            </a:r>
-            <a:endParaRPr sz="1400">
-              <a:solidFill>
-                <a:schemeClr val="dk1"/>
-              </a:solidFill>
-            </a:endParaRPr>
-          </a:p>
-          <a:p>
-            <a:pPr indent="0" lvl="0" marL="0" rtl="0" algn="l">
-              <a:lnSpc>
-                <a:spcPct val="90000"/>
-              </a:lnSpc>
-              <a:spcBef>
-                <a:spcPts val="1000"/>
-              </a:spcBef>
-              <a:spcAft>
-                <a:spcPts val="0"/>
-              </a:spcAft>
-              <a:buNone/>
-            </a:pPr>
-            <a:r>
-              <a:rPr lang="en" sz="1100" u="sng">
-                <a:solidFill>
-                  <a:schemeClr val="hlink"/>
-                </a:solidFill>
-                <a:hlinkClick r:id="rId3"/>
-              </a:rPr>
-              <a:t>https://sunlit-mix-274903.wl.r.appspot.com/</a:t>
-            </a:r>
-            <a:endParaRPr sz="2200">
-              <a:solidFill>
-                <a:schemeClr val="dk1"/>
-              </a:solidFill>
-            </a:endParaRPr>
-          </a:p>
-          <a:p>
-            <a:pPr indent="0" lvl="0" marL="0" rtl="0" algn="l">
               <a:spcBef>
                 <a:spcPts val="0"/>
               </a:spcBef>
@@ -8666,7 +9066,7 @@
       </p:sp>
       <p:pic>
         <p:nvPicPr>
-          <p:cNvPr id="150" name="Google Shape;150;p27"/>
+          <p:cNvPr id="153" name="Google Shape;153;p27"/>
           <p:cNvPicPr preferRelativeResize="0"/>
           <p:nvPr/>
         </p:nvPicPr>
@@ -8680,8 +9080,8 @@
         </p:blipFill>
         <p:spPr>
           <a:xfrm>
-            <a:off x="2166000" y="3406350"/>
-            <a:ext cx="3881776" cy="1690600"/>
+            <a:off x="371250" y="2571750"/>
+            <a:ext cx="4800951" cy="2090925"/>
           </a:xfrm>
           <a:prstGeom prst="rect">
             <a:avLst/>
@@ -8694,7 +9094,7 @@
       </p:pic>
       <p:pic>
         <p:nvPicPr>
-          <p:cNvPr id="151" name="Google Shape;151;p27"/>
+          <p:cNvPr id="154" name="Google Shape;154;p27"/>
           <p:cNvPicPr preferRelativeResize="0"/>
           <p:nvPr/>
         </p:nvPicPr>
@@ -8708,7 +9108,7 @@
         </p:blipFill>
         <p:spPr>
           <a:xfrm>
-            <a:off x="6177426" y="2192025"/>
+            <a:off x="5936526" y="2202350"/>
             <a:ext cx="2789500" cy="2829700"/>
           </a:xfrm>
           <a:prstGeom prst="rect">
@@ -8733,7 +9133,7 @@
   <p:cSld>
     <p:spTree>
       <p:nvGrpSpPr>
-        <p:cNvPr id="155" name="Shape 155"/>
+        <p:cNvPr id="158" name="Shape 158"/>
         <p:cNvGrpSpPr/>
         <p:nvPr/>
       </p:nvGrpSpPr>
@@ -8747,7 +9147,7 @@
       </p:grpSpPr>
       <p:sp>
         <p:nvSpPr>
-          <p:cNvPr id="156" name="Google Shape;156;p28"/>
+          <p:cNvPr id="159" name="Google Shape;159;p28"/>
           <p:cNvSpPr txBox="1"/>
           <p:nvPr>
             <p:ph type="title"/>
@@ -8779,15 +9179,15 @@
             </a:pPr>
             <a:r>
               <a:rPr lang="en" sz="3100"/>
-              <a:t>Tests/Demo</a:t>
-            </a:r>
-            <a:endParaRPr sz="1100"/>
+              <a:t>Usage</a:t>
+            </a:r>
+            <a:endParaRPr sz="3100"/>
           </a:p>
         </p:txBody>
       </p:sp>
       <p:sp>
         <p:nvSpPr>
-          <p:cNvPr id="157" name="Google Shape;157;p28"/>
+          <p:cNvPr id="160" name="Google Shape;160;p28"/>
           <p:cNvSpPr txBox="1"/>
           <p:nvPr>
             <p:ph idx="1" type="body"/>
@@ -8795,7 +9195,7 @@
         </p:nvSpPr>
         <p:spPr>
           <a:xfrm>
-            <a:off x="91675" y="573425"/>
+            <a:off x="53900" y="565850"/>
             <a:ext cx="8795400" cy="3179400"/>
           </a:xfrm>
           <a:prstGeom prst="rect">
@@ -8821,20 +9221,478 @@
               <a:buNone/>
             </a:pPr>
             <a:r>
-              <a:rPr lang="en" sz="2200">
+              <a:rPr b="1" lang="en" sz="2400">
                 <a:solidFill>
                   <a:schemeClr val="dk1"/>
                 </a:solidFill>
               </a:rPr>
-              <a:t>•Screen Capture Images</a:t>
+              <a:t>Use Cases</a:t>
+            </a:r>
+            <a:endParaRPr b="1" sz="2400">
+              <a:solidFill>
+                <a:schemeClr val="dk1"/>
+              </a:solidFill>
+            </a:endParaRPr>
+          </a:p>
+          <a:p>
+            <a:pPr indent="0" lvl="0" marL="685800" rtl="0" algn="just">
+              <a:spcBef>
+                <a:spcPts val="0"/>
+              </a:spcBef>
+              <a:spcAft>
+                <a:spcPts val="0"/>
+              </a:spcAft>
+              <a:buNone/>
+            </a:pPr>
+            <a:r>
+              <a:rPr lang="en" sz="1100">
+                <a:solidFill>
+                  <a:schemeClr val="dk1"/>
+                </a:solidFill>
+              </a:rPr>
+              <a:t>•</a:t>
+            </a:r>
+            <a:r>
+              <a:rPr lang="en" sz="700">
+                <a:solidFill>
+                  <a:schemeClr val="dk1"/>
+                </a:solidFill>
+                <a:latin typeface="Times New Roman"/>
+                <a:ea typeface="Times New Roman"/>
+                <a:cs typeface="Times New Roman"/>
+                <a:sym typeface="Times New Roman"/>
+              </a:rPr>
+              <a:t>      </a:t>
+            </a:r>
+            <a:r>
+              <a:rPr lang="en" sz="1100">
+                <a:solidFill>
+                  <a:schemeClr val="dk1"/>
+                </a:solidFill>
+              </a:rPr>
+              <a:t>Metal Use case</a:t>
             </a:r>
             <a:endParaRPr sz="1100">
               <a:solidFill>
                 <a:schemeClr val="dk1"/>
               </a:solidFill>
-              <a:highlight>
-                <a:srgbClr val="FFFF00"/>
-              </a:highlight>
+            </a:endParaRPr>
+          </a:p>
+          <a:p>
+            <a:pPr indent="0" lvl="0" marL="914400" rtl="0" algn="just">
+              <a:spcBef>
+                <a:spcPts val="600"/>
+              </a:spcBef>
+              <a:spcAft>
+                <a:spcPts val="0"/>
+              </a:spcAft>
+              <a:buNone/>
+            </a:pPr>
+            <a:r>
+              <a:rPr lang="en" sz="1100">
+                <a:solidFill>
+                  <a:schemeClr val="dk1"/>
+                </a:solidFill>
+                <a:latin typeface="Courier New"/>
+                <a:ea typeface="Courier New"/>
+                <a:cs typeface="Courier New"/>
+                <a:sym typeface="Courier New"/>
+              </a:rPr>
+              <a:t>o</a:t>
+            </a:r>
+            <a:r>
+              <a:rPr lang="en" sz="700">
+                <a:solidFill>
+                  <a:schemeClr val="dk1"/>
+                </a:solidFill>
+                <a:latin typeface="Times New Roman"/>
+                <a:ea typeface="Times New Roman"/>
+                <a:cs typeface="Times New Roman"/>
+                <a:sym typeface="Times New Roman"/>
+              </a:rPr>
+              <a:t>   </a:t>
+            </a:r>
+            <a:r>
+              <a:rPr lang="en" sz="1100">
+                <a:solidFill>
+                  <a:schemeClr val="dk1"/>
+                </a:solidFill>
+              </a:rPr>
+              <a:t>The driver will recognize that Metal has been chosen</a:t>
+            </a:r>
+            <a:endParaRPr sz="1100">
+              <a:solidFill>
+                <a:schemeClr val="dk1"/>
+              </a:solidFill>
+            </a:endParaRPr>
+          </a:p>
+          <a:p>
+            <a:pPr indent="0" lvl="0" marL="914400" rtl="0" algn="just">
+              <a:spcBef>
+                <a:spcPts val="600"/>
+              </a:spcBef>
+              <a:spcAft>
+                <a:spcPts val="0"/>
+              </a:spcAft>
+              <a:buNone/>
+            </a:pPr>
+            <a:r>
+              <a:rPr lang="en" sz="1100">
+                <a:solidFill>
+                  <a:schemeClr val="dk1"/>
+                </a:solidFill>
+                <a:latin typeface="Courier New"/>
+                <a:ea typeface="Courier New"/>
+                <a:cs typeface="Courier New"/>
+                <a:sym typeface="Courier New"/>
+              </a:rPr>
+              <a:t>o</a:t>
+            </a:r>
+            <a:r>
+              <a:rPr lang="en" sz="700">
+                <a:solidFill>
+                  <a:schemeClr val="dk1"/>
+                </a:solidFill>
+                <a:latin typeface="Times New Roman"/>
+                <a:ea typeface="Times New Roman"/>
+                <a:cs typeface="Times New Roman"/>
+                <a:sym typeface="Times New Roman"/>
+              </a:rPr>
+              <a:t>   </a:t>
+            </a:r>
+            <a:r>
+              <a:rPr lang="en" sz="1100">
+                <a:solidFill>
+                  <a:schemeClr val="dk1"/>
+                </a:solidFill>
+              </a:rPr>
+              <a:t>The Metal model with a noise batch size of 32 and noise of 100 will be loaded within the driver</a:t>
+            </a:r>
+            <a:endParaRPr sz="2400">
+              <a:solidFill>
+                <a:schemeClr val="dk1"/>
+              </a:solidFill>
+            </a:endParaRPr>
+          </a:p>
+          <a:p>
+            <a:pPr indent="0" lvl="0" marL="685800" rtl="0" algn="just">
+              <a:spcBef>
+                <a:spcPts val="600"/>
+              </a:spcBef>
+              <a:spcAft>
+                <a:spcPts val="0"/>
+              </a:spcAft>
+              <a:buNone/>
+            </a:pPr>
+            <a:r>
+              <a:rPr lang="en" sz="1100">
+                <a:solidFill>
+                  <a:schemeClr val="dk1"/>
+                </a:solidFill>
+              </a:rPr>
+              <a:t>•</a:t>
+            </a:r>
+            <a:r>
+              <a:rPr lang="en" sz="700">
+                <a:solidFill>
+                  <a:schemeClr val="dk1"/>
+                </a:solidFill>
+                <a:latin typeface="Times New Roman"/>
+                <a:ea typeface="Times New Roman"/>
+                <a:cs typeface="Times New Roman"/>
+                <a:sym typeface="Times New Roman"/>
+              </a:rPr>
+              <a:t>      </a:t>
+            </a:r>
+            <a:r>
+              <a:rPr lang="en" sz="1100">
+                <a:solidFill>
+                  <a:schemeClr val="dk1"/>
+                </a:solidFill>
+              </a:rPr>
+              <a:t>EDM use case</a:t>
+            </a:r>
+            <a:endParaRPr sz="1100">
+              <a:solidFill>
+                <a:schemeClr val="dk1"/>
+              </a:solidFill>
+            </a:endParaRPr>
+          </a:p>
+          <a:p>
+            <a:pPr indent="0" lvl="0" marL="914400" rtl="0" algn="just">
+              <a:spcBef>
+                <a:spcPts val="600"/>
+              </a:spcBef>
+              <a:spcAft>
+                <a:spcPts val="0"/>
+              </a:spcAft>
+              <a:buNone/>
+            </a:pPr>
+            <a:r>
+              <a:rPr lang="en" sz="1100">
+                <a:solidFill>
+                  <a:schemeClr val="dk1"/>
+                </a:solidFill>
+                <a:latin typeface="Courier New"/>
+                <a:ea typeface="Courier New"/>
+                <a:cs typeface="Courier New"/>
+                <a:sym typeface="Courier New"/>
+              </a:rPr>
+              <a:t>o</a:t>
+            </a:r>
+            <a:r>
+              <a:rPr lang="en" sz="700">
+                <a:solidFill>
+                  <a:schemeClr val="dk1"/>
+                </a:solidFill>
+                <a:latin typeface="Times New Roman"/>
+                <a:ea typeface="Times New Roman"/>
+                <a:cs typeface="Times New Roman"/>
+                <a:sym typeface="Times New Roman"/>
+              </a:rPr>
+              <a:t>   </a:t>
+            </a:r>
+            <a:r>
+              <a:rPr lang="en" sz="1100">
+                <a:solidFill>
+                  <a:schemeClr val="dk1"/>
+                </a:solidFill>
+              </a:rPr>
+              <a:t>The driver will recognize that EDM has been chosen</a:t>
+            </a:r>
+            <a:endParaRPr sz="1100">
+              <a:solidFill>
+                <a:schemeClr val="dk1"/>
+              </a:solidFill>
+            </a:endParaRPr>
+          </a:p>
+          <a:p>
+            <a:pPr indent="0" lvl="0" marL="914400" rtl="0" algn="just">
+              <a:spcBef>
+                <a:spcPts val="600"/>
+              </a:spcBef>
+              <a:spcAft>
+                <a:spcPts val="0"/>
+              </a:spcAft>
+              <a:buNone/>
+            </a:pPr>
+            <a:r>
+              <a:rPr lang="en" sz="1100">
+                <a:solidFill>
+                  <a:schemeClr val="dk1"/>
+                </a:solidFill>
+                <a:latin typeface="Courier New"/>
+                <a:ea typeface="Courier New"/>
+                <a:cs typeface="Courier New"/>
+                <a:sym typeface="Courier New"/>
+              </a:rPr>
+              <a:t>o</a:t>
+            </a:r>
+            <a:r>
+              <a:rPr lang="en" sz="700">
+                <a:solidFill>
+                  <a:schemeClr val="dk1"/>
+                </a:solidFill>
+                <a:latin typeface="Times New Roman"/>
+                <a:ea typeface="Times New Roman"/>
+                <a:cs typeface="Times New Roman"/>
+                <a:sym typeface="Times New Roman"/>
+              </a:rPr>
+              <a:t>   </a:t>
+            </a:r>
+            <a:r>
+              <a:rPr lang="en" sz="1100">
+                <a:solidFill>
+                  <a:schemeClr val="dk1"/>
+                </a:solidFill>
+              </a:rPr>
+              <a:t>The EDM model with a noise batch size of 32 and noise of 100 will be loaded within the driver </a:t>
+            </a:r>
+            <a:endParaRPr sz="1100">
+              <a:solidFill>
+                <a:schemeClr val="dk1"/>
+              </a:solidFill>
+            </a:endParaRPr>
+          </a:p>
+          <a:p>
+            <a:pPr indent="0" lvl="0" marL="685800" rtl="0" algn="just">
+              <a:spcBef>
+                <a:spcPts val="600"/>
+              </a:spcBef>
+              <a:spcAft>
+                <a:spcPts val="0"/>
+              </a:spcAft>
+              <a:buNone/>
+            </a:pPr>
+            <a:r>
+              <a:rPr lang="en" sz="1100">
+                <a:solidFill>
+                  <a:schemeClr val="dk1"/>
+                </a:solidFill>
+              </a:rPr>
+              <a:t>•</a:t>
+            </a:r>
+            <a:r>
+              <a:rPr lang="en" sz="700">
+                <a:solidFill>
+                  <a:schemeClr val="dk1"/>
+                </a:solidFill>
+                <a:latin typeface="Times New Roman"/>
+                <a:ea typeface="Times New Roman"/>
+                <a:cs typeface="Times New Roman"/>
+                <a:sym typeface="Times New Roman"/>
+              </a:rPr>
+              <a:t>      </a:t>
+            </a:r>
+            <a:r>
+              <a:rPr lang="en" sz="1100">
+                <a:solidFill>
+                  <a:schemeClr val="dk1"/>
+                </a:solidFill>
+              </a:rPr>
+              <a:t>Default use case</a:t>
+            </a:r>
+            <a:endParaRPr sz="1100">
+              <a:solidFill>
+                <a:schemeClr val="dk1"/>
+              </a:solidFill>
+            </a:endParaRPr>
+          </a:p>
+          <a:p>
+            <a:pPr indent="0" lvl="0" marL="914400" rtl="0" algn="just">
+              <a:spcBef>
+                <a:spcPts val="600"/>
+              </a:spcBef>
+              <a:spcAft>
+                <a:spcPts val="0"/>
+              </a:spcAft>
+              <a:buNone/>
+            </a:pPr>
+            <a:r>
+              <a:rPr lang="en" sz="1100">
+                <a:solidFill>
+                  <a:schemeClr val="dk1"/>
+                </a:solidFill>
+                <a:latin typeface="Courier New"/>
+                <a:ea typeface="Courier New"/>
+                <a:cs typeface="Courier New"/>
+                <a:sym typeface="Courier New"/>
+              </a:rPr>
+              <a:t>o</a:t>
+            </a:r>
+            <a:r>
+              <a:rPr lang="en" sz="700">
+                <a:solidFill>
+                  <a:schemeClr val="dk1"/>
+                </a:solidFill>
+                <a:latin typeface="Times New Roman"/>
+                <a:ea typeface="Times New Roman"/>
+                <a:cs typeface="Times New Roman"/>
+                <a:sym typeface="Times New Roman"/>
+              </a:rPr>
+              <a:t>   </a:t>
+            </a:r>
+            <a:r>
+              <a:rPr lang="en" sz="1100">
+                <a:solidFill>
+                  <a:schemeClr val="dk1"/>
+                </a:solidFill>
+              </a:rPr>
+              <a:t>The driver will recognize that Metal has been chosen</a:t>
+            </a:r>
+            <a:endParaRPr sz="1100">
+              <a:solidFill>
+                <a:schemeClr val="dk1"/>
+              </a:solidFill>
+            </a:endParaRPr>
+          </a:p>
+          <a:p>
+            <a:pPr indent="0" lvl="0" marL="914400" rtl="0" algn="just">
+              <a:spcBef>
+                <a:spcPts val="600"/>
+              </a:spcBef>
+              <a:spcAft>
+                <a:spcPts val="0"/>
+              </a:spcAft>
+              <a:buNone/>
+            </a:pPr>
+            <a:r>
+              <a:rPr lang="en" sz="1100">
+                <a:solidFill>
+                  <a:schemeClr val="dk1"/>
+                </a:solidFill>
+                <a:latin typeface="Courier New"/>
+                <a:ea typeface="Courier New"/>
+                <a:cs typeface="Courier New"/>
+                <a:sym typeface="Courier New"/>
+              </a:rPr>
+              <a:t>o</a:t>
+            </a:r>
+            <a:r>
+              <a:rPr lang="en" sz="700">
+                <a:solidFill>
+                  <a:schemeClr val="dk1"/>
+                </a:solidFill>
+                <a:latin typeface="Times New Roman"/>
+                <a:ea typeface="Times New Roman"/>
+                <a:cs typeface="Times New Roman"/>
+                <a:sym typeface="Times New Roman"/>
+              </a:rPr>
+              <a:t>   </a:t>
+            </a:r>
+            <a:r>
+              <a:rPr lang="en" sz="1100">
+                <a:solidFill>
+                  <a:schemeClr val="dk1"/>
+                </a:solidFill>
+              </a:rPr>
+              <a:t>The General model with a noise batch size of 32 and noise of 128 will be loaded within the driver</a:t>
+            </a:r>
+            <a:endParaRPr sz="1100">
+              <a:solidFill>
+                <a:schemeClr val="dk1"/>
+              </a:solidFill>
+            </a:endParaRPr>
+          </a:p>
+          <a:p>
+            <a:pPr indent="0" lvl="0" marL="0" rtl="0" algn="just">
+              <a:spcBef>
+                <a:spcPts val="600"/>
+              </a:spcBef>
+              <a:spcAft>
+                <a:spcPts val="0"/>
+              </a:spcAft>
+              <a:buNone/>
+            </a:pPr>
+            <a:r>
+              <a:t/>
+            </a:r>
+            <a:endParaRPr sz="1100">
+              <a:solidFill>
+                <a:schemeClr val="dk1"/>
+              </a:solidFill>
+            </a:endParaRPr>
+          </a:p>
+          <a:p>
+            <a:pPr indent="0" lvl="0" marL="0" rtl="0" algn="l">
+              <a:lnSpc>
+                <a:spcPct val="90000"/>
+              </a:lnSpc>
+              <a:spcBef>
+                <a:spcPts val="1000"/>
+              </a:spcBef>
+              <a:spcAft>
+                <a:spcPts val="0"/>
+              </a:spcAft>
+              <a:buNone/>
+            </a:pPr>
+            <a:r>
+              <a:t/>
+            </a:r>
+            <a:endParaRPr sz="2400">
+              <a:solidFill>
+                <a:schemeClr val="dk1"/>
+              </a:solidFill>
             </a:endParaRPr>
           </a:p>
           <a:p>
@@ -8889,7 +9747,7 @@
   <p:cSld>
     <p:spTree>
       <p:nvGrpSpPr>
-        <p:cNvPr id="161" name="Shape 161"/>
+        <p:cNvPr id="164" name="Shape 164"/>
         <p:cNvGrpSpPr/>
         <p:nvPr/>
       </p:nvGrpSpPr>
@@ -8903,7 +9761,7 @@
       </p:grpSpPr>
       <p:sp>
         <p:nvSpPr>
-          <p:cNvPr id="162" name="Google Shape;162;p29"/>
+          <p:cNvPr id="165" name="Google Shape;165;p29"/>
           <p:cNvSpPr txBox="1"/>
           <p:nvPr>
             <p:ph type="title"/>
@@ -8943,7 +9801,7 @@
       </p:sp>
       <p:sp>
         <p:nvSpPr>
-          <p:cNvPr id="163" name="Google Shape;163;p29"/>
+          <p:cNvPr id="166" name="Google Shape;166;p29"/>
           <p:cNvSpPr txBox="1"/>
           <p:nvPr>
             <p:ph idx="1" type="body"/>
@@ -8951,7 +9809,7 @@
         </p:nvSpPr>
         <p:spPr>
           <a:xfrm>
-            <a:off x="91675" y="573425"/>
+            <a:off x="38775" y="581000"/>
             <a:ext cx="8795400" cy="3179400"/>
           </a:xfrm>
           <a:prstGeom prst="rect">
@@ -8977,14 +9835,14 @@
               <a:buNone/>
             </a:pPr>
             <a:r>
-              <a:rPr lang="en" sz="2200">
+              <a:rPr b="1" lang="en" sz="2400">
                 <a:solidFill>
                   <a:schemeClr val="dk1"/>
                 </a:solidFill>
               </a:rPr>
-              <a:t>•Use Cases</a:t>
-            </a:r>
-            <a:endParaRPr sz="1100">
+              <a:t>Intro Screen</a:t>
+            </a:r>
+            <a:endParaRPr b="1" sz="1300">
               <a:solidFill>
                 <a:schemeClr val="dk1"/>
               </a:solidFill>
@@ -9032,6 +9890,578 @@
           </a:p>
         </p:txBody>
       </p:sp>
+      <p:pic>
+        <p:nvPicPr>
+          <p:cNvPr id="167" name="Google Shape;167;p29"/>
+          <p:cNvPicPr preferRelativeResize="0"/>
+          <p:nvPr/>
+        </p:nvPicPr>
+        <p:blipFill>
+          <a:blip r:embed="rId3">
+            <a:alphaModFix/>
+          </a:blip>
+          <a:stretch>
+            <a:fillRect/>
+          </a:stretch>
+        </p:blipFill>
+        <p:spPr>
+          <a:xfrm>
+            <a:off x="1321148" y="1590950"/>
+            <a:ext cx="6230650" cy="2383900"/>
+          </a:xfrm>
+          <a:prstGeom prst="rect">
+            <a:avLst/>
+          </a:prstGeom>
+          <a:noFill/>
+          <a:ln>
+            <a:noFill/>
+          </a:ln>
+        </p:spPr>
+      </p:pic>
+    </p:spTree>
+  </p:cSld>
+  <p:clrMapOvr>
+    <a:masterClrMapping/>
+  </p:clrMapOvr>
+</p:sld>
+</file>
+
+<file path=ppt/slides/slide18.xml><?xml version="1.0" encoding="utf-8"?>
+<p:sld xmlns:a="http://schemas.openxmlformats.org/drawingml/2006/main" xmlns:r="http://schemas.openxmlformats.org/officeDocument/2006/relationships" xmlns:mc="http://schemas.openxmlformats.org/markup-compatibility/2006" xmlns:mv="urn:schemas-microsoft-com:mac:vml" xmlns:p="http://schemas.openxmlformats.org/presentationml/2006/main" xmlns:c="http://schemas.openxmlformats.org/drawingml/2006/chart" xmlns:dgm="http://schemas.openxmlformats.org/drawingml/2006/diagram" xmlns:o="urn:schemas-microsoft-com:office:office" xmlns:v="urn:schemas-microsoft-com:vml" xmlns:pvml="urn:schemas-microsoft-com:office:powerpoint" xmlns:com="http://schemas.openxmlformats.org/drawingml/2006/compatibility" xmlns:p14="http://schemas.microsoft.com/office/powerpoint/2010/main" xmlns:p15="http://schemas.microsoft.com/office/powerpoint/2012/main">
+  <p:cSld>
+    <p:spTree>
+      <p:nvGrpSpPr>
+        <p:cNvPr id="171" name="Shape 171"/>
+        <p:cNvGrpSpPr/>
+        <p:nvPr/>
+      </p:nvGrpSpPr>
+      <p:grpSpPr>
+        <a:xfrm>
+          <a:off x="0" y="0"/>
+          <a:ext cx="0" cy="0"/>
+          <a:chOff x="0" y="0"/>
+          <a:chExt cx="0" cy="0"/>
+        </a:xfrm>
+      </p:grpSpPr>
+      <p:sp>
+        <p:nvSpPr>
+          <p:cNvPr id="172" name="Google Shape;172;p30"/>
+          <p:cNvSpPr txBox="1"/>
+          <p:nvPr>
+            <p:ph type="title"/>
+          </p:nvPr>
+        </p:nvSpPr>
+        <p:spPr>
+          <a:xfrm>
+            <a:off x="371250" y="0"/>
+            <a:ext cx="8401500" cy="755700"/>
+          </a:xfrm>
+          <a:prstGeom prst="rect">
+            <a:avLst/>
+          </a:prstGeom>
+        </p:spPr>
+        <p:txBody>
+          <a:bodyPr anchorCtr="0" anchor="b" bIns="91425" lIns="91425" spcFirstLastPara="1" rIns="91425" wrap="square" tIns="91425">
+            <a:noAutofit/>
+          </a:bodyPr>
+          <a:lstStyle/>
+          <a:p>
+            <a:pPr indent="0" lvl="0" marL="0" rtl="0" algn="ctr">
+              <a:spcBef>
+                <a:spcPts val="0"/>
+              </a:spcBef>
+              <a:spcAft>
+                <a:spcPts val="0"/>
+              </a:spcAft>
+              <a:buNone/>
+            </a:pPr>
+            <a:r>
+              <a:rPr lang="en" sz="3100"/>
+              <a:t>Tests/Demo</a:t>
+            </a:r>
+            <a:endParaRPr sz="1100"/>
+          </a:p>
+        </p:txBody>
+      </p:sp>
+      <p:sp>
+        <p:nvSpPr>
+          <p:cNvPr id="173" name="Google Shape;173;p30"/>
+          <p:cNvSpPr txBox="1"/>
+          <p:nvPr>
+            <p:ph idx="1" type="body"/>
+          </p:nvPr>
+        </p:nvSpPr>
+        <p:spPr>
+          <a:xfrm>
+            <a:off x="38775" y="581000"/>
+            <a:ext cx="8795400" cy="3179400"/>
+          </a:xfrm>
+          <a:prstGeom prst="rect">
+            <a:avLst/>
+          </a:prstGeom>
+        </p:spPr>
+        <p:txBody>
+          <a:bodyPr anchorCtr="0" anchor="t" bIns="91425" lIns="91425" spcFirstLastPara="1" rIns="91425" wrap="square" tIns="91425">
+            <a:noAutofit/>
+          </a:bodyPr>
+          <a:lstStyle/>
+          <a:p>
+            <a:pPr indent="0" lvl="0" marL="0" rtl="0" algn="l">
+              <a:lnSpc>
+                <a:spcPct val="90000"/>
+              </a:lnSpc>
+              <a:spcBef>
+                <a:spcPts val="1000"/>
+              </a:spcBef>
+              <a:spcAft>
+                <a:spcPts val="0"/>
+              </a:spcAft>
+              <a:buNone/>
+            </a:pPr>
+            <a:r>
+              <a:rPr b="1" lang="en" sz="2400">
+                <a:solidFill>
+                  <a:schemeClr val="dk1"/>
+                </a:solidFill>
+              </a:rPr>
+              <a:t>EDM examples</a:t>
+            </a:r>
+            <a:endParaRPr b="1" sz="1300">
+              <a:solidFill>
+                <a:schemeClr val="dk1"/>
+              </a:solidFill>
+              <a:highlight>
+                <a:srgbClr val="FFFF00"/>
+              </a:highlight>
+            </a:endParaRPr>
+          </a:p>
+          <a:p>
+            <a:pPr indent="0" lvl="0" marL="0" rtl="0" algn="l">
+              <a:lnSpc>
+                <a:spcPct val="90000"/>
+              </a:lnSpc>
+              <a:spcBef>
+                <a:spcPts val="1000"/>
+              </a:spcBef>
+              <a:spcAft>
+                <a:spcPts val="0"/>
+              </a:spcAft>
+              <a:buNone/>
+            </a:pPr>
+            <a:r>
+              <a:t/>
+            </a:r>
+            <a:endParaRPr sz="2200">
+              <a:solidFill>
+                <a:schemeClr val="dk1"/>
+              </a:solidFill>
+            </a:endParaRPr>
+          </a:p>
+          <a:p>
+            <a:pPr indent="0" lvl="0" marL="0" rtl="0" algn="l">
+              <a:spcBef>
+                <a:spcPts val="0"/>
+              </a:spcBef>
+              <a:spcAft>
+                <a:spcPts val="1600"/>
+              </a:spcAft>
+              <a:buNone/>
+            </a:pPr>
+            <a:r>
+              <a:t/>
+            </a:r>
+            <a:endParaRPr/>
+          </a:p>
+        </p:txBody>
+      </p:sp>
+      <p:pic>
+        <p:nvPicPr>
+          <p:cNvPr id="174" name="Google Shape;174;p30"/>
+          <p:cNvPicPr preferRelativeResize="0"/>
+          <p:nvPr/>
+        </p:nvPicPr>
+        <p:blipFill>
+          <a:blip r:embed="rId3">
+            <a:alphaModFix/>
+          </a:blip>
+          <a:stretch>
+            <a:fillRect/>
+          </a:stretch>
+        </p:blipFill>
+        <p:spPr>
+          <a:xfrm>
+            <a:off x="419049" y="1441975"/>
+            <a:ext cx="2221775" cy="2259550"/>
+          </a:xfrm>
+          <a:prstGeom prst="rect">
+            <a:avLst/>
+          </a:prstGeom>
+          <a:noFill/>
+          <a:ln>
+            <a:noFill/>
+          </a:ln>
+        </p:spPr>
+      </p:pic>
+      <p:pic>
+        <p:nvPicPr>
+          <p:cNvPr id="175" name="Google Shape;175;p30"/>
+          <p:cNvPicPr preferRelativeResize="0"/>
+          <p:nvPr/>
+        </p:nvPicPr>
+        <p:blipFill>
+          <a:blip r:embed="rId4">
+            <a:alphaModFix/>
+          </a:blip>
+          <a:stretch>
+            <a:fillRect/>
+          </a:stretch>
+        </p:blipFill>
+        <p:spPr>
+          <a:xfrm>
+            <a:off x="2640823" y="1590200"/>
+            <a:ext cx="2045500" cy="1985050"/>
+          </a:xfrm>
+          <a:prstGeom prst="rect">
+            <a:avLst/>
+          </a:prstGeom>
+          <a:noFill/>
+          <a:ln>
+            <a:noFill/>
+          </a:ln>
+        </p:spPr>
+      </p:pic>
+      <p:pic>
+        <p:nvPicPr>
+          <p:cNvPr id="176" name="Google Shape;176;p30"/>
+          <p:cNvPicPr preferRelativeResize="0"/>
+          <p:nvPr/>
+        </p:nvPicPr>
+        <p:blipFill>
+          <a:blip r:embed="rId5">
+            <a:alphaModFix/>
+          </a:blip>
+          <a:stretch>
+            <a:fillRect/>
+          </a:stretch>
+        </p:blipFill>
+        <p:spPr>
+          <a:xfrm>
+            <a:off x="4686325" y="1608350"/>
+            <a:ext cx="2045501" cy="1926782"/>
+          </a:xfrm>
+          <a:prstGeom prst="rect">
+            <a:avLst/>
+          </a:prstGeom>
+          <a:noFill/>
+          <a:ln>
+            <a:noFill/>
+          </a:ln>
+        </p:spPr>
+      </p:pic>
+      <p:pic>
+        <p:nvPicPr>
+          <p:cNvPr id="177" name="Google Shape;177;p30"/>
+          <p:cNvPicPr preferRelativeResize="0"/>
+          <p:nvPr/>
+        </p:nvPicPr>
+        <p:blipFill>
+          <a:blip r:embed="rId6">
+            <a:alphaModFix/>
+          </a:blip>
+          <a:stretch>
+            <a:fillRect/>
+          </a:stretch>
+        </p:blipFill>
+        <p:spPr>
+          <a:xfrm>
+            <a:off x="6731826" y="1608350"/>
+            <a:ext cx="1993130" cy="1926775"/>
+          </a:xfrm>
+          <a:prstGeom prst="rect">
+            <a:avLst/>
+          </a:prstGeom>
+          <a:noFill/>
+          <a:ln>
+            <a:noFill/>
+          </a:ln>
+        </p:spPr>
+      </p:pic>
+    </p:spTree>
+  </p:cSld>
+  <p:clrMapOvr>
+    <a:masterClrMapping/>
+  </p:clrMapOvr>
+</p:sld>
+</file>
+
+<file path=ppt/slides/slide19.xml><?xml version="1.0" encoding="utf-8"?>
+<p:sld xmlns:a="http://schemas.openxmlformats.org/drawingml/2006/main" xmlns:r="http://schemas.openxmlformats.org/officeDocument/2006/relationships" xmlns:mc="http://schemas.openxmlformats.org/markup-compatibility/2006" xmlns:mv="urn:schemas-microsoft-com:mac:vml" xmlns:p="http://schemas.openxmlformats.org/presentationml/2006/main" xmlns:c="http://schemas.openxmlformats.org/drawingml/2006/chart" xmlns:dgm="http://schemas.openxmlformats.org/drawingml/2006/diagram" xmlns:o="urn:schemas-microsoft-com:office:office" xmlns:v="urn:schemas-microsoft-com:vml" xmlns:pvml="urn:schemas-microsoft-com:office:powerpoint" xmlns:com="http://schemas.openxmlformats.org/drawingml/2006/compatibility" xmlns:p14="http://schemas.microsoft.com/office/powerpoint/2010/main" xmlns:p15="http://schemas.microsoft.com/office/powerpoint/2012/main">
+  <p:cSld>
+    <p:spTree>
+      <p:nvGrpSpPr>
+        <p:cNvPr id="181" name="Shape 181"/>
+        <p:cNvGrpSpPr/>
+        <p:nvPr/>
+      </p:nvGrpSpPr>
+      <p:grpSpPr>
+        <a:xfrm>
+          <a:off x="0" y="0"/>
+          <a:ext cx="0" cy="0"/>
+          <a:chOff x="0" y="0"/>
+          <a:chExt cx="0" cy="0"/>
+        </a:xfrm>
+      </p:grpSpPr>
+      <p:sp>
+        <p:nvSpPr>
+          <p:cNvPr id="182" name="Google Shape;182;p31"/>
+          <p:cNvSpPr txBox="1"/>
+          <p:nvPr>
+            <p:ph type="title"/>
+          </p:nvPr>
+        </p:nvSpPr>
+        <p:spPr>
+          <a:xfrm>
+            <a:off x="371250" y="0"/>
+            <a:ext cx="8401500" cy="755700"/>
+          </a:xfrm>
+          <a:prstGeom prst="rect">
+            <a:avLst/>
+          </a:prstGeom>
+        </p:spPr>
+        <p:txBody>
+          <a:bodyPr anchorCtr="0" anchor="b" bIns="91425" lIns="91425" spcFirstLastPara="1" rIns="91425" wrap="square" tIns="91425">
+            <a:noAutofit/>
+          </a:bodyPr>
+          <a:lstStyle/>
+          <a:p>
+            <a:pPr indent="0" lvl="0" marL="0" rtl="0" algn="ctr">
+              <a:spcBef>
+                <a:spcPts val="0"/>
+              </a:spcBef>
+              <a:spcAft>
+                <a:spcPts val="0"/>
+              </a:spcAft>
+              <a:buNone/>
+            </a:pPr>
+            <a:r>
+              <a:rPr lang="en" sz="3100"/>
+              <a:t>Tests/Demo</a:t>
+            </a:r>
+            <a:endParaRPr sz="1100"/>
+          </a:p>
+        </p:txBody>
+      </p:sp>
+      <p:sp>
+        <p:nvSpPr>
+          <p:cNvPr id="183" name="Google Shape;183;p31"/>
+          <p:cNvSpPr txBox="1"/>
+          <p:nvPr>
+            <p:ph idx="1" type="body"/>
+          </p:nvPr>
+        </p:nvSpPr>
+        <p:spPr>
+          <a:xfrm>
+            <a:off x="0" y="581000"/>
+            <a:ext cx="8795400" cy="3179400"/>
+          </a:xfrm>
+          <a:prstGeom prst="rect">
+            <a:avLst/>
+          </a:prstGeom>
+        </p:spPr>
+        <p:txBody>
+          <a:bodyPr anchorCtr="0" anchor="t" bIns="91425" lIns="91425" spcFirstLastPara="1" rIns="91425" wrap="square" tIns="91425">
+            <a:noAutofit/>
+          </a:bodyPr>
+          <a:lstStyle/>
+          <a:p>
+            <a:pPr indent="0" lvl="0" marL="0" rtl="0" algn="l">
+              <a:lnSpc>
+                <a:spcPct val="90000"/>
+              </a:lnSpc>
+              <a:spcBef>
+                <a:spcPts val="1000"/>
+              </a:spcBef>
+              <a:spcAft>
+                <a:spcPts val="0"/>
+              </a:spcAft>
+              <a:buNone/>
+            </a:pPr>
+            <a:r>
+              <a:rPr b="1" lang="en" sz="2400">
+                <a:solidFill>
+                  <a:schemeClr val="dk1"/>
+                </a:solidFill>
+              </a:rPr>
+              <a:t>Metal </a:t>
+            </a:r>
+            <a:r>
+              <a:rPr b="1" lang="en" sz="2400">
+                <a:solidFill>
+                  <a:schemeClr val="dk1"/>
+                </a:solidFill>
+              </a:rPr>
+              <a:t>examples</a:t>
+            </a:r>
+            <a:endParaRPr b="1" sz="1300">
+              <a:solidFill>
+                <a:schemeClr val="dk1"/>
+              </a:solidFill>
+              <a:highlight>
+                <a:srgbClr val="FFFF00"/>
+              </a:highlight>
+            </a:endParaRPr>
+          </a:p>
+          <a:p>
+            <a:pPr indent="0" lvl="0" marL="0" rtl="0" algn="l">
+              <a:lnSpc>
+                <a:spcPct val="90000"/>
+              </a:lnSpc>
+              <a:spcBef>
+                <a:spcPts val="1000"/>
+              </a:spcBef>
+              <a:spcAft>
+                <a:spcPts val="0"/>
+              </a:spcAft>
+              <a:buNone/>
+            </a:pPr>
+            <a:r>
+              <a:t/>
+            </a:r>
+            <a:endParaRPr sz="2200">
+              <a:solidFill>
+                <a:schemeClr val="dk1"/>
+              </a:solidFill>
+            </a:endParaRPr>
+          </a:p>
+          <a:p>
+            <a:pPr indent="0" lvl="0" marL="0" rtl="0" algn="l">
+              <a:spcBef>
+                <a:spcPts val="0"/>
+              </a:spcBef>
+              <a:spcAft>
+                <a:spcPts val="1600"/>
+              </a:spcAft>
+              <a:buNone/>
+            </a:pPr>
+            <a:r>
+              <a:t/>
+            </a:r>
+            <a:endParaRPr/>
+          </a:p>
+        </p:txBody>
+      </p:sp>
+      <p:pic>
+        <p:nvPicPr>
+          <p:cNvPr id="184" name="Google Shape;184;p31"/>
+          <p:cNvPicPr preferRelativeResize="0"/>
+          <p:nvPr/>
+        </p:nvPicPr>
+        <p:blipFill>
+          <a:blip r:embed="rId3">
+            <a:alphaModFix/>
+          </a:blip>
+          <a:stretch>
+            <a:fillRect/>
+          </a:stretch>
+        </p:blipFill>
+        <p:spPr>
+          <a:xfrm>
+            <a:off x="2608800" y="1585100"/>
+            <a:ext cx="1945674" cy="1939750"/>
+          </a:xfrm>
+          <a:prstGeom prst="rect">
+            <a:avLst/>
+          </a:prstGeom>
+          <a:noFill/>
+          <a:ln>
+            <a:noFill/>
+          </a:ln>
+        </p:spPr>
+      </p:pic>
+      <p:pic>
+        <p:nvPicPr>
+          <p:cNvPr id="185" name="Google Shape;185;p31"/>
+          <p:cNvPicPr preferRelativeResize="0"/>
+          <p:nvPr/>
+        </p:nvPicPr>
+        <p:blipFill>
+          <a:blip r:embed="rId4">
+            <a:alphaModFix/>
+          </a:blip>
+          <a:stretch>
+            <a:fillRect/>
+          </a:stretch>
+        </p:blipFill>
+        <p:spPr>
+          <a:xfrm>
+            <a:off x="485275" y="1606763"/>
+            <a:ext cx="1945676" cy="1951630"/>
+          </a:xfrm>
+          <a:prstGeom prst="rect">
+            <a:avLst/>
+          </a:prstGeom>
+          <a:noFill/>
+          <a:ln>
+            <a:noFill/>
+          </a:ln>
+        </p:spPr>
+      </p:pic>
+      <p:pic>
+        <p:nvPicPr>
+          <p:cNvPr id="186" name="Google Shape;186;p31"/>
+          <p:cNvPicPr preferRelativeResize="0"/>
+          <p:nvPr/>
+        </p:nvPicPr>
+        <p:blipFill>
+          <a:blip r:embed="rId5">
+            <a:alphaModFix/>
+          </a:blip>
+          <a:stretch>
+            <a:fillRect/>
+          </a:stretch>
+        </p:blipFill>
+        <p:spPr>
+          <a:xfrm>
+            <a:off x="4671850" y="1605225"/>
+            <a:ext cx="1911175" cy="1899499"/>
+          </a:xfrm>
+          <a:prstGeom prst="rect">
+            <a:avLst/>
+          </a:prstGeom>
+          <a:noFill/>
+          <a:ln>
+            <a:noFill/>
+          </a:ln>
+        </p:spPr>
+      </p:pic>
+      <p:pic>
+        <p:nvPicPr>
+          <p:cNvPr id="187" name="Google Shape;187;p31"/>
+          <p:cNvPicPr preferRelativeResize="0"/>
+          <p:nvPr/>
+        </p:nvPicPr>
+        <p:blipFill>
+          <a:blip r:embed="rId6">
+            <a:alphaModFix/>
+          </a:blip>
+          <a:stretch>
+            <a:fillRect/>
+          </a:stretch>
+        </p:blipFill>
+        <p:spPr>
+          <a:xfrm>
+            <a:off x="6747550" y="1585100"/>
+            <a:ext cx="1911175" cy="1882081"/>
+          </a:xfrm>
+          <a:prstGeom prst="rect">
+            <a:avLst/>
+          </a:prstGeom>
+          <a:noFill/>
+          <a:ln>
+            <a:noFill/>
+          </a:ln>
+        </p:spPr>
+      </p:pic>
     </p:spTree>
   </p:cSld>
   <p:clrMapOvr>
@@ -9146,14 +10576,6 @@
               <a:buNone/>
             </a:pPr>
             <a:r>
-              <a:rPr lang="en" sz="2400">
-                <a:solidFill>
-                  <a:schemeClr val="dk1"/>
-                </a:solidFill>
-              </a:rPr>
-              <a:t>•</a:t>
-            </a:r>
-            <a:r>
               <a:rPr b="1" lang="en" sz="2400">
                 <a:solidFill>
                   <a:schemeClr val="dk1"/>
@@ -9246,6 +10668,658 @@
             </a:pPr>
             <a:r>
               <a:t/>
+            </a:r>
+            <a:endParaRPr/>
+          </a:p>
+        </p:txBody>
+      </p:sp>
+    </p:spTree>
+  </p:cSld>
+  <p:clrMapOvr>
+    <a:masterClrMapping/>
+  </p:clrMapOvr>
+</p:sld>
+</file>
+
+<file path=ppt/slides/slide20.xml><?xml version="1.0" encoding="utf-8"?>
+<p:sld xmlns:a="http://schemas.openxmlformats.org/drawingml/2006/main" xmlns:r="http://schemas.openxmlformats.org/officeDocument/2006/relationships" xmlns:mc="http://schemas.openxmlformats.org/markup-compatibility/2006" xmlns:mv="urn:schemas-microsoft-com:mac:vml" xmlns:p="http://schemas.openxmlformats.org/presentationml/2006/main" xmlns:c="http://schemas.openxmlformats.org/drawingml/2006/chart" xmlns:dgm="http://schemas.openxmlformats.org/drawingml/2006/diagram" xmlns:o="urn:schemas-microsoft-com:office:office" xmlns:v="urn:schemas-microsoft-com:vml" xmlns:pvml="urn:schemas-microsoft-com:office:powerpoint" xmlns:com="http://schemas.openxmlformats.org/drawingml/2006/compatibility" xmlns:p14="http://schemas.microsoft.com/office/powerpoint/2010/main" xmlns:p15="http://schemas.microsoft.com/office/powerpoint/2012/main">
+  <p:cSld>
+    <p:spTree>
+      <p:nvGrpSpPr>
+        <p:cNvPr id="191" name="Shape 191"/>
+        <p:cNvGrpSpPr/>
+        <p:nvPr/>
+      </p:nvGrpSpPr>
+      <p:grpSpPr>
+        <a:xfrm>
+          <a:off x="0" y="0"/>
+          <a:ext cx="0" cy="0"/>
+          <a:chOff x="0" y="0"/>
+          <a:chExt cx="0" cy="0"/>
+        </a:xfrm>
+      </p:grpSpPr>
+      <p:sp>
+        <p:nvSpPr>
+          <p:cNvPr id="192" name="Google Shape;192;p32"/>
+          <p:cNvSpPr txBox="1"/>
+          <p:nvPr>
+            <p:ph type="title"/>
+          </p:nvPr>
+        </p:nvSpPr>
+        <p:spPr>
+          <a:xfrm>
+            <a:off x="371250" y="0"/>
+            <a:ext cx="8401500" cy="755700"/>
+          </a:xfrm>
+          <a:prstGeom prst="rect">
+            <a:avLst/>
+          </a:prstGeom>
+        </p:spPr>
+        <p:txBody>
+          <a:bodyPr anchorCtr="0" anchor="b" bIns="91425" lIns="91425" spcFirstLastPara="1" rIns="91425" wrap="square" tIns="91425">
+            <a:noAutofit/>
+          </a:bodyPr>
+          <a:lstStyle/>
+          <a:p>
+            <a:pPr indent="0" lvl="0" marL="0" rtl="0" algn="ctr">
+              <a:spcBef>
+                <a:spcPts val="0"/>
+              </a:spcBef>
+              <a:spcAft>
+                <a:spcPts val="0"/>
+              </a:spcAft>
+              <a:buNone/>
+            </a:pPr>
+            <a:r>
+              <a:rPr lang="en" sz="3100"/>
+              <a:t>Tests/Demo</a:t>
+            </a:r>
+            <a:endParaRPr sz="1100"/>
+          </a:p>
+        </p:txBody>
+      </p:sp>
+      <p:sp>
+        <p:nvSpPr>
+          <p:cNvPr id="193" name="Google Shape;193;p32"/>
+          <p:cNvSpPr txBox="1"/>
+          <p:nvPr>
+            <p:ph idx="1" type="body"/>
+          </p:nvPr>
+        </p:nvSpPr>
+        <p:spPr>
+          <a:xfrm>
+            <a:off x="0" y="543225"/>
+            <a:ext cx="8795400" cy="3179400"/>
+          </a:xfrm>
+          <a:prstGeom prst="rect">
+            <a:avLst/>
+          </a:prstGeom>
+        </p:spPr>
+        <p:txBody>
+          <a:bodyPr anchorCtr="0" anchor="t" bIns="91425" lIns="91425" spcFirstLastPara="1" rIns="91425" wrap="square" tIns="91425">
+            <a:noAutofit/>
+          </a:bodyPr>
+          <a:lstStyle/>
+          <a:p>
+            <a:pPr indent="0" lvl="0" marL="0" rtl="0" algn="l">
+              <a:lnSpc>
+                <a:spcPct val="90000"/>
+              </a:lnSpc>
+              <a:spcBef>
+                <a:spcPts val="1000"/>
+              </a:spcBef>
+              <a:spcAft>
+                <a:spcPts val="0"/>
+              </a:spcAft>
+              <a:buNone/>
+            </a:pPr>
+            <a:r>
+              <a:rPr b="1" lang="en" sz="2400">
+                <a:solidFill>
+                  <a:schemeClr val="dk1"/>
+                </a:solidFill>
+              </a:rPr>
+              <a:t>General examples</a:t>
+            </a:r>
+            <a:endParaRPr b="1" sz="1300">
+              <a:solidFill>
+                <a:schemeClr val="dk1"/>
+              </a:solidFill>
+              <a:highlight>
+                <a:srgbClr val="FFFF00"/>
+              </a:highlight>
+            </a:endParaRPr>
+          </a:p>
+          <a:p>
+            <a:pPr indent="0" lvl="0" marL="0" rtl="0" algn="l">
+              <a:lnSpc>
+                <a:spcPct val="90000"/>
+              </a:lnSpc>
+              <a:spcBef>
+                <a:spcPts val="1000"/>
+              </a:spcBef>
+              <a:spcAft>
+                <a:spcPts val="0"/>
+              </a:spcAft>
+              <a:buNone/>
+            </a:pPr>
+            <a:r>
+              <a:t/>
+            </a:r>
+            <a:endParaRPr sz="2200">
+              <a:solidFill>
+                <a:schemeClr val="dk1"/>
+              </a:solidFill>
+            </a:endParaRPr>
+          </a:p>
+          <a:p>
+            <a:pPr indent="0" lvl="0" marL="0" rtl="0" algn="l">
+              <a:spcBef>
+                <a:spcPts val="0"/>
+              </a:spcBef>
+              <a:spcAft>
+                <a:spcPts val="1600"/>
+              </a:spcAft>
+              <a:buNone/>
+            </a:pPr>
+            <a:r>
+              <a:t/>
+            </a:r>
+            <a:endParaRPr/>
+          </a:p>
+        </p:txBody>
+      </p:sp>
+      <p:pic>
+        <p:nvPicPr>
+          <p:cNvPr id="194" name="Google Shape;194;p32"/>
+          <p:cNvPicPr preferRelativeResize="0"/>
+          <p:nvPr/>
+        </p:nvPicPr>
+        <p:blipFill>
+          <a:blip r:embed="rId3">
+            <a:alphaModFix/>
+          </a:blip>
+          <a:stretch>
+            <a:fillRect/>
+          </a:stretch>
+        </p:blipFill>
+        <p:spPr>
+          <a:xfrm>
+            <a:off x="6707682" y="1627691"/>
+            <a:ext cx="1911175" cy="1888121"/>
+          </a:xfrm>
+          <a:prstGeom prst="rect">
+            <a:avLst/>
+          </a:prstGeom>
+          <a:noFill/>
+          <a:ln>
+            <a:noFill/>
+          </a:ln>
+        </p:spPr>
+      </p:pic>
+      <p:pic>
+        <p:nvPicPr>
+          <p:cNvPr id="195" name="Google Shape;195;p32"/>
+          <p:cNvPicPr preferRelativeResize="0"/>
+          <p:nvPr/>
+        </p:nvPicPr>
+        <p:blipFill>
+          <a:blip r:embed="rId4">
+            <a:alphaModFix/>
+          </a:blip>
+          <a:stretch>
+            <a:fillRect/>
+          </a:stretch>
+        </p:blipFill>
+        <p:spPr>
+          <a:xfrm>
+            <a:off x="4652575" y="1627700"/>
+            <a:ext cx="1992816" cy="1888100"/>
+          </a:xfrm>
+          <a:prstGeom prst="rect">
+            <a:avLst/>
+          </a:prstGeom>
+          <a:noFill/>
+          <a:ln>
+            <a:noFill/>
+          </a:ln>
+        </p:spPr>
+      </p:pic>
+      <p:pic>
+        <p:nvPicPr>
+          <p:cNvPr id="196" name="Google Shape;196;p32"/>
+          <p:cNvPicPr preferRelativeResize="0"/>
+          <p:nvPr/>
+        </p:nvPicPr>
+        <p:blipFill>
+          <a:blip r:embed="rId5">
+            <a:alphaModFix/>
+          </a:blip>
+          <a:stretch>
+            <a:fillRect/>
+          </a:stretch>
+        </p:blipFill>
+        <p:spPr>
+          <a:xfrm>
+            <a:off x="2628000" y="1633500"/>
+            <a:ext cx="1911176" cy="1876496"/>
+          </a:xfrm>
+          <a:prstGeom prst="rect">
+            <a:avLst/>
+          </a:prstGeom>
+          <a:noFill/>
+          <a:ln>
+            <a:noFill/>
+          </a:ln>
+        </p:spPr>
+      </p:pic>
+      <p:pic>
+        <p:nvPicPr>
+          <p:cNvPr id="197" name="Google Shape;197;p32"/>
+          <p:cNvPicPr preferRelativeResize="0"/>
+          <p:nvPr/>
+        </p:nvPicPr>
+        <p:blipFill>
+          <a:blip r:embed="rId6">
+            <a:alphaModFix/>
+          </a:blip>
+          <a:stretch>
+            <a:fillRect/>
+          </a:stretch>
+        </p:blipFill>
+        <p:spPr>
+          <a:xfrm>
+            <a:off x="525150" y="1633500"/>
+            <a:ext cx="1864912" cy="1876501"/>
+          </a:xfrm>
+          <a:prstGeom prst="rect">
+            <a:avLst/>
+          </a:prstGeom>
+          <a:noFill/>
+          <a:ln>
+            <a:noFill/>
+          </a:ln>
+        </p:spPr>
+      </p:pic>
+    </p:spTree>
+  </p:cSld>
+  <p:clrMapOvr>
+    <a:masterClrMapping/>
+  </p:clrMapOvr>
+</p:sld>
+</file>
+
+<file path=ppt/slides/slide21.xml><?xml version="1.0" encoding="utf-8"?>
+<p:sld xmlns:a="http://schemas.openxmlformats.org/drawingml/2006/main" xmlns:r="http://schemas.openxmlformats.org/officeDocument/2006/relationships" xmlns:mc="http://schemas.openxmlformats.org/markup-compatibility/2006" xmlns:mv="urn:schemas-microsoft-com:mac:vml" xmlns:p="http://schemas.openxmlformats.org/presentationml/2006/main" xmlns:c="http://schemas.openxmlformats.org/drawingml/2006/chart" xmlns:dgm="http://schemas.openxmlformats.org/drawingml/2006/diagram" xmlns:o="urn:schemas-microsoft-com:office:office" xmlns:v="urn:schemas-microsoft-com:vml" xmlns:pvml="urn:schemas-microsoft-com:office:powerpoint" xmlns:com="http://schemas.openxmlformats.org/drawingml/2006/compatibility" xmlns:p14="http://schemas.microsoft.com/office/powerpoint/2010/main" xmlns:p15="http://schemas.microsoft.com/office/powerpoint/2012/main">
+  <p:cSld>
+    <p:spTree>
+      <p:nvGrpSpPr>
+        <p:cNvPr id="201" name="Shape 201"/>
+        <p:cNvGrpSpPr/>
+        <p:nvPr/>
+      </p:nvGrpSpPr>
+      <p:grpSpPr>
+        <a:xfrm>
+          <a:off x="0" y="0"/>
+          <a:ext cx="0" cy="0"/>
+          <a:chOff x="0" y="0"/>
+          <a:chExt cx="0" cy="0"/>
+        </a:xfrm>
+      </p:grpSpPr>
+      <p:sp>
+        <p:nvSpPr>
+          <p:cNvPr id="202" name="Google Shape;202;p33"/>
+          <p:cNvSpPr txBox="1"/>
+          <p:nvPr>
+            <p:ph type="title"/>
+          </p:nvPr>
+        </p:nvSpPr>
+        <p:spPr>
+          <a:xfrm>
+            <a:off x="3168000" y="633900"/>
+            <a:ext cx="2808000" cy="755700"/>
+          </a:xfrm>
+          <a:prstGeom prst="rect">
+            <a:avLst/>
+          </a:prstGeom>
+        </p:spPr>
+        <p:txBody>
+          <a:bodyPr anchorCtr="0" anchor="b" bIns="91425" lIns="91425" spcFirstLastPara="1" rIns="91425" wrap="square" tIns="91425">
+            <a:noAutofit/>
+          </a:bodyPr>
+          <a:lstStyle/>
+          <a:p>
+            <a:pPr indent="0" lvl="0" marL="0" rtl="0" algn="ctr">
+              <a:spcBef>
+                <a:spcPts val="0"/>
+              </a:spcBef>
+              <a:spcAft>
+                <a:spcPts val="0"/>
+              </a:spcAft>
+              <a:buNone/>
+            </a:pPr>
+            <a:r>
+              <a:rPr lang="en"/>
+              <a:t>References</a:t>
+            </a:r>
+            <a:endParaRPr/>
+          </a:p>
+        </p:txBody>
+      </p:sp>
+      <p:sp>
+        <p:nvSpPr>
+          <p:cNvPr id="203" name="Google Shape;203;p33"/>
+          <p:cNvSpPr txBox="1"/>
+          <p:nvPr>
+            <p:ph idx="1" type="body"/>
+          </p:nvPr>
+        </p:nvSpPr>
+        <p:spPr>
+          <a:xfrm>
+            <a:off x="1455450" y="1481575"/>
+            <a:ext cx="6233100" cy="3179400"/>
+          </a:xfrm>
+          <a:prstGeom prst="rect">
+            <a:avLst/>
+          </a:prstGeom>
+        </p:spPr>
+        <p:txBody>
+          <a:bodyPr anchorCtr="0" anchor="t" bIns="91425" lIns="91425" spcFirstLastPara="1" rIns="91425" wrap="square" tIns="91425">
+            <a:noAutofit/>
+          </a:bodyPr>
+          <a:lstStyle/>
+          <a:p>
+            <a:pPr indent="-304800" lvl="1" marL="914400" rtl="0" algn="l">
+              <a:lnSpc>
+                <a:spcPct val="100000"/>
+              </a:lnSpc>
+              <a:spcBef>
+                <a:spcPts val="0"/>
+              </a:spcBef>
+              <a:spcAft>
+                <a:spcPts val="0"/>
+              </a:spcAft>
+              <a:buClr>
+                <a:schemeClr val="dk1"/>
+              </a:buClr>
+              <a:buSzPts val="1200"/>
+              <a:buFont typeface="Arial"/>
+              <a:buChar char="o"/>
+            </a:pPr>
+            <a:r>
+              <a:rPr lang="en">
+                <a:solidFill>
+                  <a:srgbClr val="222222"/>
+                </a:solidFill>
+                <a:highlight>
+                  <a:srgbClr val="FFFFFF"/>
+                </a:highlight>
+              </a:rPr>
+              <a:t>Radford, Alec, Luke Metz, and Soumith Chintala. "Unsupervised representation learning with deep convolutional generative adversarial networks." </a:t>
+            </a:r>
+            <a:r>
+              <a:rPr i="1" lang="en">
+                <a:solidFill>
+                  <a:srgbClr val="222222"/>
+                </a:solidFill>
+                <a:highlight>
+                  <a:srgbClr val="FFFFFF"/>
+                </a:highlight>
+              </a:rPr>
+              <a:t>arXiv preprint arXiv:1511.06434</a:t>
+            </a:r>
+            <a:r>
+              <a:rPr lang="en">
+                <a:solidFill>
+                  <a:srgbClr val="222222"/>
+                </a:solidFill>
+                <a:highlight>
+                  <a:srgbClr val="FFFFFF"/>
+                </a:highlight>
+              </a:rPr>
+              <a:t> (2015).</a:t>
+            </a:r>
+            <a:endParaRPr>
+              <a:solidFill>
+                <a:schemeClr val="dk1"/>
+              </a:solidFill>
+            </a:endParaRPr>
+          </a:p>
+          <a:p>
+            <a:pPr indent="-304800" lvl="2" marL="1371600" rtl="0" algn="just">
+              <a:lnSpc>
+                <a:spcPct val="100000"/>
+              </a:lnSpc>
+              <a:spcBef>
+                <a:spcPts val="600"/>
+              </a:spcBef>
+              <a:spcAft>
+                <a:spcPts val="0"/>
+              </a:spcAft>
+              <a:buClr>
+                <a:schemeClr val="dk1"/>
+              </a:buClr>
+              <a:buSzPts val="1200"/>
+              <a:buFont typeface="Arial"/>
+              <a:buChar char="▪"/>
+            </a:pPr>
+            <a:r>
+              <a:rPr lang="en" u="sng">
+                <a:solidFill>
+                  <a:srgbClr val="1155CC"/>
+                </a:solidFill>
+                <a:hlinkClick r:id="rId3"/>
+              </a:rPr>
+              <a:t>https://arxiv.org/pdf/1511.06434.pdf%C3</a:t>
+            </a:r>
+            <a:endParaRPr>
+              <a:solidFill>
+                <a:schemeClr val="dk1"/>
+              </a:solidFill>
+            </a:endParaRPr>
+          </a:p>
+          <a:p>
+            <a:pPr indent="-304800" lvl="1" marL="914400" rtl="0" algn="just">
+              <a:lnSpc>
+                <a:spcPct val="100000"/>
+              </a:lnSpc>
+              <a:spcBef>
+                <a:spcPts val="600"/>
+              </a:spcBef>
+              <a:spcAft>
+                <a:spcPts val="0"/>
+              </a:spcAft>
+              <a:buClr>
+                <a:schemeClr val="dk1"/>
+              </a:buClr>
+              <a:buSzPts val="1200"/>
+              <a:buFont typeface="Arial"/>
+              <a:buChar char="o"/>
+            </a:pPr>
+            <a:r>
+              <a:rPr lang="en">
+                <a:solidFill>
+                  <a:srgbClr val="333333"/>
+                </a:solidFill>
+              </a:rPr>
+              <a:t>Shrestha, Anish. “Generating Modern Art Using Generative Adversarial Network(GAN) on Spell.” </a:t>
+            </a:r>
+            <a:r>
+              <a:rPr i="1" lang="en">
+                <a:solidFill>
+                  <a:srgbClr val="333333"/>
+                </a:solidFill>
+              </a:rPr>
+              <a:t>Medium</a:t>
+            </a:r>
+            <a:r>
+              <a:rPr lang="en">
+                <a:solidFill>
+                  <a:srgbClr val="333333"/>
+                </a:solidFill>
+              </a:rPr>
+              <a:t>, Towards Data Science, 3 Feb. 2020, towardsdatascience.com/generating-modern-arts-using-generative-adversarial-network-gan-on-spell-39f67f83c7b4.</a:t>
+            </a:r>
+            <a:endParaRPr>
+              <a:solidFill>
+                <a:schemeClr val="dk1"/>
+              </a:solidFill>
+            </a:endParaRPr>
+          </a:p>
+          <a:p>
+            <a:pPr indent="-304800" lvl="1" marL="914400" rtl="0" algn="l">
+              <a:lnSpc>
+                <a:spcPct val="100000"/>
+              </a:lnSpc>
+              <a:spcBef>
+                <a:spcPts val="600"/>
+              </a:spcBef>
+              <a:spcAft>
+                <a:spcPts val="0"/>
+              </a:spcAft>
+              <a:buClr>
+                <a:schemeClr val="dk1"/>
+              </a:buClr>
+              <a:buSzPts val="1200"/>
+              <a:buFont typeface="Arial"/>
+              <a:buChar char="o"/>
+            </a:pPr>
+            <a:r>
+              <a:rPr lang="en">
+                <a:solidFill>
+                  <a:srgbClr val="333333"/>
+                </a:solidFill>
+                <a:highlight>
+                  <a:srgbClr val="FFFFFF"/>
+                </a:highlight>
+              </a:rPr>
+              <a:t>Wibowo, Haryo Akbarianto. “Generate Anime Style Face Using DCGAN and Explore Its Latent Feature Representation.” </a:t>
+            </a:r>
+            <a:r>
+              <a:rPr i="1" lang="en">
+                <a:solidFill>
+                  <a:srgbClr val="333333"/>
+                </a:solidFill>
+                <a:highlight>
+                  <a:srgbClr val="FFFFFF"/>
+                </a:highlight>
+              </a:rPr>
+              <a:t>Medium</a:t>
+            </a:r>
+            <a:r>
+              <a:rPr lang="en">
+                <a:solidFill>
+                  <a:srgbClr val="333333"/>
+                </a:solidFill>
+                <a:highlight>
+                  <a:srgbClr val="FFFFFF"/>
+                </a:highlight>
+              </a:rPr>
+              <a:t>, Towards Data Science, 13 Apr. 2019</a:t>
+            </a:r>
+            <a:endParaRPr>
+              <a:solidFill>
+                <a:srgbClr val="333333"/>
+              </a:solidFill>
+              <a:highlight>
+                <a:srgbClr val="FFFFFF"/>
+              </a:highlight>
+            </a:endParaRPr>
+          </a:p>
+          <a:p>
+            <a:pPr indent="-304800" lvl="2" marL="1371600" rtl="0" algn="l">
+              <a:lnSpc>
+                <a:spcPct val="100000"/>
+              </a:lnSpc>
+              <a:spcBef>
+                <a:spcPts val="600"/>
+              </a:spcBef>
+              <a:spcAft>
+                <a:spcPts val="0"/>
+              </a:spcAft>
+              <a:buClr>
+                <a:schemeClr val="dk1"/>
+              </a:buClr>
+              <a:buSzPts val="1200"/>
+              <a:buFont typeface="Arial"/>
+              <a:buChar char="▪"/>
+            </a:pPr>
+            <a:r>
+              <a:rPr lang="en">
+                <a:solidFill>
+                  <a:srgbClr val="333333"/>
+                </a:solidFill>
+                <a:highlight>
+                  <a:srgbClr val="FFFFFF"/>
+                </a:highlight>
+              </a:rPr>
+              <a:t>towardsdatascience.com/generate-anime-style-face-using-dcgan-and-explore-its-latent-feature-representation-ae0e905f3974.</a:t>
+            </a:r>
+            <a:endParaRPr>
+              <a:solidFill>
+                <a:schemeClr val="dk1"/>
+              </a:solidFill>
+            </a:endParaRPr>
+          </a:p>
+          <a:p>
+            <a:pPr indent="-304800" lvl="1" marL="914400" rtl="0" algn="just">
+              <a:lnSpc>
+                <a:spcPct val="100000"/>
+              </a:lnSpc>
+              <a:spcBef>
+                <a:spcPts val="600"/>
+              </a:spcBef>
+              <a:spcAft>
+                <a:spcPts val="0"/>
+              </a:spcAft>
+              <a:buClr>
+                <a:schemeClr val="dk1"/>
+              </a:buClr>
+              <a:buSzPts val="1200"/>
+              <a:buFont typeface="Arial"/>
+              <a:buChar char="o"/>
+            </a:pPr>
+            <a:r>
+              <a:rPr lang="en" u="sng">
+                <a:solidFill>
+                  <a:srgbClr val="0000FF"/>
+                </a:solidFill>
+                <a:hlinkClick r:id="rId4"/>
+              </a:rPr>
+              <a:t>https://spotipy.readthedocs.io/en/2.12.0/</a:t>
+            </a:r>
+            <a:endParaRPr>
+              <a:solidFill>
+                <a:schemeClr val="dk1"/>
+              </a:solidFill>
+            </a:endParaRPr>
+          </a:p>
+          <a:p>
+            <a:pPr indent="-304800" lvl="1" marL="914400" rtl="0" algn="just">
+              <a:lnSpc>
+                <a:spcPct val="100000"/>
+              </a:lnSpc>
+              <a:spcBef>
+                <a:spcPts val="600"/>
+              </a:spcBef>
+              <a:spcAft>
+                <a:spcPts val="600"/>
+              </a:spcAft>
+              <a:buClr>
+                <a:schemeClr val="dk1"/>
+              </a:buClr>
+              <a:buSzPts val="1200"/>
+              <a:buFont typeface="Arial"/>
+              <a:buChar char="o"/>
+            </a:pPr>
+            <a:r>
+              <a:rPr lang="en" u="sng">
+                <a:solidFill>
+                  <a:srgbClr val="1155CC"/>
+                </a:solidFill>
+                <a:hlinkClick r:id="rId5"/>
+              </a:rPr>
+              <a:t>https://archive.org/details/audio-covers</a:t>
             </a:r>
             <a:endParaRPr/>
           </a:p>
@@ -9587,22 +11661,18 @@
           </a:bodyPr>
           <a:lstStyle/>
           <a:p>
-            <a:pPr indent="0" lvl="0" marL="0" rtl="0" algn="l">
+            <a:pPr indent="-304800" lvl="0" marL="457200" rtl="0" algn="just">
               <a:lnSpc>
-                <a:spcPct val="90000"/>
+                <a:spcPct val="100000"/>
               </a:lnSpc>
               <a:spcBef>
-                <a:spcPts val="1000"/>
-              </a:spcBef>
-              <a:spcAft>
-                <a:spcPts val="0"/>
-              </a:spcAft>
-              <a:buClr>
-                <a:schemeClr val="dk1"/>
-              </a:buClr>
-              <a:buSzPts val="1100"/>
-              <a:buFont typeface="Arial"/>
-              <a:buNone/>
+                <a:spcPts val="0"/>
+              </a:spcBef>
+              <a:spcAft>
+                <a:spcPts val="0"/>
+              </a:spcAft>
+              <a:buSzPts val="1200"/>
+              <a:buChar char="●"/>
             </a:pPr>
             <a:r>
               <a:rPr lang="en" sz="1800">
@@ -9610,48 +11680,36 @@
                   <a:schemeClr val="dk1"/>
                 </a:solidFill>
               </a:rPr>
-              <a:t>•Code Repo (URL)</a:t>
-            </a:r>
-            <a:r>
-              <a:rPr lang="en" sz="2800">
-                <a:solidFill>
-                  <a:schemeClr val="dk1"/>
-                </a:solidFill>
-              </a:rPr>
-              <a:t>:</a:t>
-            </a:r>
-            <a:r>
-              <a:rPr lang="en" u="sng">
-                <a:solidFill>
-                  <a:schemeClr val="hlink"/>
+              <a:t>Link to web service:</a:t>
+            </a:r>
+            <a:r>
+              <a:rPr lang="en" sz="1100" u="sng">
+                <a:solidFill>
+                  <a:srgbClr val="1155CC"/>
                 </a:solidFill>
                 <a:hlinkClick r:id="rId3"/>
               </a:rPr>
-              <a:t>https://github.com/mmcdermott011/GAAAN/tree/master</a:t>
-            </a:r>
-            <a:endParaRPr sz="2900">
+              <a:t> https://sunlit-mix-274903.wl.r.appspot.com</a:t>
+            </a:r>
+            <a:endParaRPr sz="1100">
               <a:solidFill>
                 <a:schemeClr val="dk1"/>
               </a:solidFill>
             </a:endParaRPr>
           </a:p>
           <a:p>
-            <a:pPr indent="0" lvl="0" marL="0" rtl="0" algn="l">
+            <a:pPr indent="-304800" lvl="0" marL="457200" rtl="0" algn="l">
               <a:lnSpc>
                 <a:spcPct val="90000"/>
               </a:lnSpc>
               <a:spcBef>
-                <a:spcPts val="1000"/>
-              </a:spcBef>
-              <a:spcAft>
-                <a:spcPts val="0"/>
-              </a:spcAft>
-              <a:buClr>
-                <a:schemeClr val="dk1"/>
-              </a:buClr>
-              <a:buSzPts val="1100"/>
-              <a:buFont typeface="Arial"/>
-              <a:buNone/>
+                <a:spcPts val="600"/>
+              </a:spcBef>
+              <a:spcAft>
+                <a:spcPts val="0"/>
+              </a:spcAft>
+              <a:buSzPts val="1200"/>
+              <a:buChar char="●"/>
             </a:pPr>
             <a:r>
               <a:rPr lang="en" sz="1800">
@@ -9659,57 +11717,24 @@
                   <a:schemeClr val="dk1"/>
                 </a:solidFill>
               </a:rPr>
-              <a:t>•Presentation Slides (URL):</a:t>
-            </a:r>
-            <a:r>
-              <a:rPr lang="en" u="sng">
+              <a:t>Repo (URL)</a:t>
+            </a:r>
+            <a:r>
+              <a:rPr lang="en" sz="2800">
+                <a:solidFill>
+                  <a:schemeClr val="dk1"/>
+                </a:solidFill>
+              </a:rPr>
+              <a:t>: </a:t>
+            </a:r>
+            <a:r>
+              <a:rPr lang="en" sz="1100" u="sng">
                 <a:solidFill>
                   <a:schemeClr val="hlink"/>
                 </a:solidFill>
                 <a:hlinkClick r:id="rId4"/>
               </a:rPr>
-              <a:t>https://github.com/mmcdermott011/GAAAN/tree/master/Deliverables</a:t>
-            </a:r>
-            <a:endParaRPr sz="1900">
-              <a:solidFill>
-                <a:schemeClr val="dk1"/>
-              </a:solidFill>
-            </a:endParaRPr>
-          </a:p>
-          <a:p>
-            <a:pPr indent="0" lvl="0" marL="0" rtl="0" algn="l">
-              <a:lnSpc>
-                <a:spcPct val="90000"/>
-              </a:lnSpc>
-              <a:spcBef>
-                <a:spcPts val="1000"/>
-              </a:spcBef>
-              <a:spcAft>
-                <a:spcPts val="0"/>
-              </a:spcAft>
-              <a:buClr>
-                <a:schemeClr val="dk1"/>
-              </a:buClr>
-              <a:buSzPts val="1100"/>
-              <a:buFont typeface="Arial"/>
-              <a:buNone/>
-            </a:pPr>
-            <a:r>
-              <a:rPr lang="en" sz="1800">
-                <a:solidFill>
-                  <a:schemeClr val="dk1"/>
-                </a:solidFill>
-              </a:rPr>
-              <a:t>•Demo Screen Capture Images (URL):</a:t>
-            </a:r>
-            <a:r>
-              <a:rPr lang="en" u="sng">
-                <a:solidFill>
-                  <a:schemeClr val="hlink"/>
-                </a:solidFill>
-                <a:hlinkClick r:id="rId5"/>
-              </a:rPr>
-              <a:t>https://github.com/mmcdermott011/GAAAN/tree/master/Deliverables</a:t>
+              <a:t>https://bitbucket.org/Goku_Sonic/gan/src/master/</a:t>
             </a:r>
             <a:endParaRPr sz="1900">
               <a:solidFill>
@@ -9769,8 +11794,8 @@
         </p:nvSpPr>
         <p:spPr>
           <a:xfrm>
-            <a:off x="2291675" y="117250"/>
-            <a:ext cx="6822000" cy="755700"/>
+            <a:off x="371250" y="79525"/>
+            <a:ext cx="8401500" cy="755700"/>
           </a:xfrm>
           <a:prstGeom prst="rect">
             <a:avLst/>
@@ -9782,20 +11807,20 @@
           </a:bodyPr>
           <a:lstStyle/>
           <a:p>
-            <a:pPr indent="0" lvl="0" marL="0" rtl="0" algn="l">
-              <a:spcBef>
-                <a:spcPts val="0"/>
-              </a:spcBef>
-              <a:spcAft>
-                <a:spcPts val="0"/>
-              </a:spcAft>
-              <a:buNone/>
-            </a:pPr>
-            <a:r>
-              <a:rPr lang="en" sz="3800"/>
-              <a:t>Project Summary</a:t>
-            </a:r>
-            <a:endParaRPr sz="1800"/>
+            <a:pPr indent="0" lvl="0" marL="0" rtl="0" algn="ctr">
+              <a:spcBef>
+                <a:spcPts val="0"/>
+              </a:spcBef>
+              <a:spcAft>
+                <a:spcPts val="0"/>
+              </a:spcAft>
+              <a:buNone/>
+            </a:pPr>
+            <a:r>
+              <a:rPr lang="en" sz="3100"/>
+              <a:t>Machine Learning Aspects </a:t>
+            </a:r>
+            <a:endParaRPr sz="1100"/>
           </a:p>
         </p:txBody>
       </p:sp>
@@ -9809,8 +11834,8 @@
         </p:nvSpPr>
         <p:spPr>
           <a:xfrm>
-            <a:off x="-73700" y="747250"/>
-            <a:ext cx="6353700" cy="3179400"/>
+            <a:off x="113400" y="982050"/>
+            <a:ext cx="8917200" cy="3179400"/>
           </a:xfrm>
           <a:prstGeom prst="rect">
             <a:avLst/>
@@ -9822,51 +11847,186 @@
           </a:bodyPr>
           <a:lstStyle/>
           <a:p>
-            <a:pPr indent="0" lvl="0" marL="0" rtl="0" algn="l">
+            <a:pPr indent="457200" lvl="0" marL="0" rtl="0" algn="just">
               <a:lnSpc>
-                <a:spcPct val="90000"/>
+                <a:spcPct val="100000"/>
               </a:lnSpc>
               <a:spcBef>
-                <a:spcPts val="1000"/>
-              </a:spcBef>
-              <a:spcAft>
-                <a:spcPts val="0"/>
-              </a:spcAft>
-              <a:buClr>
-                <a:schemeClr val="dk1"/>
-              </a:buClr>
-              <a:buSzPts val="1100"/>
-              <a:buFont typeface="Arial"/>
-              <a:buNone/>
-            </a:pPr>
-            <a:r>
-              <a:rPr lang="en" sz="2800">
+                <a:spcPts val="0"/>
+              </a:spcBef>
+              <a:spcAft>
+                <a:spcPts val="0"/>
+              </a:spcAft>
+              <a:buNone/>
+            </a:pPr>
+            <a:r>
+              <a:rPr b="1" lang="en" sz="2400">
                 <a:solidFill>
                   <a:schemeClr val="dk1"/>
                 </a:solidFill>
               </a:rPr>
-              <a:t>•Code What it is and what results you’ve got</a:t>
-            </a:r>
-            <a:endParaRPr sz="2800">
+              <a:t>Data</a:t>
+            </a:r>
+            <a:endParaRPr b="1" sz="2400">
               <a:solidFill>
                 <a:schemeClr val="dk1"/>
               </a:solidFill>
             </a:endParaRPr>
           </a:p>
           <a:p>
-            <a:pPr indent="0" lvl="0" marL="0" rtl="0" algn="l">
-              <a:spcBef>
-                <a:spcPts val="0"/>
-              </a:spcBef>
-              <a:spcAft>
-                <a:spcPts val="1600"/>
-              </a:spcAft>
-              <a:buNone/>
-            </a:pPr>
-            <a:r>
-              <a:t/>
-            </a:r>
-            <a:endParaRPr/>
+            <a:pPr indent="-317500" lvl="0" marL="685800" rtl="0" algn="just">
+              <a:lnSpc>
+                <a:spcPct val="100000"/>
+              </a:lnSpc>
+              <a:spcBef>
+                <a:spcPts val="600"/>
+              </a:spcBef>
+              <a:spcAft>
+                <a:spcPts val="0"/>
+              </a:spcAft>
+              <a:buClr>
+                <a:schemeClr val="dk1"/>
+              </a:buClr>
+              <a:buSzPts val="1400"/>
+              <a:buChar char="•"/>
+            </a:pPr>
+            <a:r>
+              <a:rPr lang="en" sz="1400">
+                <a:solidFill>
+                  <a:schemeClr val="dk1"/>
+                </a:solidFill>
+              </a:rPr>
+              <a:t>Originally, we were going to use the one million album artwork dataset available on the internet, but it was very large to download and we felt it was too generic, so we compiled our own dataset of 54,000 using python and the Spotify API. </a:t>
+            </a:r>
+            <a:endParaRPr sz="1400">
+              <a:solidFill>
+                <a:schemeClr val="dk1"/>
+              </a:solidFill>
+            </a:endParaRPr>
+          </a:p>
+          <a:p>
+            <a:pPr indent="-317500" lvl="0" marL="685800" rtl="0" algn="just">
+              <a:lnSpc>
+                <a:spcPct val="100000"/>
+              </a:lnSpc>
+              <a:spcBef>
+                <a:spcPts val="600"/>
+              </a:spcBef>
+              <a:spcAft>
+                <a:spcPts val="0"/>
+              </a:spcAft>
+              <a:buClr>
+                <a:schemeClr val="dk1"/>
+              </a:buClr>
+              <a:buSzPts val="1400"/>
+              <a:buChar char="•"/>
+            </a:pPr>
+            <a:r>
+              <a:rPr lang="en" sz="1400">
+                <a:solidFill>
+                  <a:schemeClr val="dk1"/>
+                </a:solidFill>
+              </a:rPr>
+              <a:t>In the GAN, all the data from the dataset is used for training the discriminator.</a:t>
+            </a:r>
+            <a:endParaRPr sz="1400">
+              <a:solidFill>
+                <a:schemeClr val="dk1"/>
+              </a:solidFill>
+            </a:endParaRPr>
+          </a:p>
+          <a:p>
+            <a:pPr indent="-317500" lvl="0" marL="685800" rtl="0" algn="just">
+              <a:lnSpc>
+                <a:spcPct val="100000"/>
+              </a:lnSpc>
+              <a:spcBef>
+                <a:spcPts val="600"/>
+              </a:spcBef>
+              <a:spcAft>
+                <a:spcPts val="0"/>
+              </a:spcAft>
+              <a:buClr>
+                <a:schemeClr val="dk1"/>
+              </a:buClr>
+              <a:buSzPts val="1400"/>
+              <a:buChar char="•"/>
+            </a:pPr>
+            <a:r>
+              <a:rPr lang="en" sz="1400">
+                <a:solidFill>
+                  <a:schemeClr val="dk1"/>
+                </a:solidFill>
+              </a:rPr>
+              <a:t>After the images were sourced, they had to be resized to size 128x128 pixels, and some sub-datasets were created to try training more specific versions of the GAN (eg, specifically on electronic dance music or specifically metal and rock genres).</a:t>
+            </a:r>
+            <a:endParaRPr sz="1400">
+              <a:solidFill>
+                <a:schemeClr val="dk1"/>
+              </a:solidFill>
+            </a:endParaRPr>
+          </a:p>
+          <a:p>
+            <a:pPr indent="-317500" lvl="0" marL="685800" rtl="0" algn="just">
+              <a:lnSpc>
+                <a:spcPct val="100000"/>
+              </a:lnSpc>
+              <a:spcBef>
+                <a:spcPts val="600"/>
+              </a:spcBef>
+              <a:spcAft>
+                <a:spcPts val="0"/>
+              </a:spcAft>
+              <a:buClr>
+                <a:schemeClr val="dk1"/>
+              </a:buClr>
+              <a:buSzPts val="1400"/>
+              <a:buChar char="•"/>
+            </a:pPr>
+            <a:r>
+              <a:rPr lang="en" sz="1400">
+                <a:solidFill>
+                  <a:schemeClr val="dk1"/>
+                </a:solidFill>
+              </a:rPr>
+              <a:t>The image data had to be normalized from values of 0-255 to -1 &amp; 1</a:t>
+            </a:r>
+            <a:endParaRPr sz="1400">
+              <a:solidFill>
+                <a:schemeClr val="dk1"/>
+              </a:solidFill>
+            </a:endParaRPr>
+          </a:p>
+          <a:p>
+            <a:pPr indent="-317500" lvl="0" marL="685800" rtl="0" algn="just">
+              <a:lnSpc>
+                <a:spcPct val="100000"/>
+              </a:lnSpc>
+              <a:spcBef>
+                <a:spcPts val="600"/>
+              </a:spcBef>
+              <a:spcAft>
+                <a:spcPts val="600"/>
+              </a:spcAft>
+              <a:buClr>
+                <a:schemeClr val="dk1"/>
+              </a:buClr>
+              <a:buSzPts val="1400"/>
+              <a:buChar char="•"/>
+            </a:pPr>
+            <a:r>
+              <a:rPr lang="en" sz="1400">
+                <a:solidFill>
+                  <a:schemeClr val="dk1"/>
+                </a:solidFill>
+              </a:rPr>
+              <a:t>The dataset was about 20GB if saved and loaded in a pkl file, which used a lot of memory when training, so we ended up dynamically loading the data in batches.</a:t>
+            </a:r>
+            <a:endParaRPr sz="2600">
+              <a:solidFill>
+                <a:schemeClr val="dk1"/>
+              </a:solidFill>
+            </a:endParaRPr>
           </a:p>
         </p:txBody>
       </p:sp>
@@ -9905,7 +12065,7 @@
         </p:nvSpPr>
         <p:spPr>
           <a:xfrm>
-            <a:off x="371250" y="79525"/>
+            <a:off x="304150" y="117300"/>
             <a:ext cx="8401500" cy="755700"/>
           </a:xfrm>
           <a:prstGeom prst="rect">
@@ -9945,8 +12105,8 @@
         </p:nvSpPr>
         <p:spPr>
           <a:xfrm>
-            <a:off x="130325" y="709450"/>
-            <a:ext cx="2808000" cy="3179400"/>
+            <a:off x="213475" y="769925"/>
+            <a:ext cx="8401500" cy="1762800"/>
           </a:xfrm>
           <a:prstGeom prst="rect">
             <a:avLst/>
@@ -9968,6 +12128,38 @@
               <a:spcAft>
                 <a:spcPts val="0"/>
               </a:spcAft>
+              <a:buNone/>
+            </a:pPr>
+            <a:r>
+              <a:rPr b="1" lang="en" sz="2400">
+                <a:solidFill>
+                  <a:schemeClr val="dk1"/>
+                </a:solidFill>
+              </a:rPr>
+              <a:t>Mode</a:t>
+            </a:r>
+            <a:r>
+              <a:rPr b="1" lang="en" sz="2400">
+                <a:solidFill>
+                  <a:schemeClr val="dk1"/>
+                </a:solidFill>
+              </a:rPr>
+              <a:t>l</a:t>
+            </a:r>
+            <a:endParaRPr b="1" sz="2400">
+              <a:solidFill>
+                <a:schemeClr val="dk1"/>
+              </a:solidFill>
+            </a:endParaRPr>
+          </a:p>
+          <a:p>
+            <a:pPr indent="0" lvl="0" marL="0" rtl="0" algn="just">
+              <a:spcBef>
+                <a:spcPts val="0"/>
+              </a:spcBef>
+              <a:spcAft>
+                <a:spcPts val="0"/>
+              </a:spcAft>
               <a:buClr>
                 <a:schemeClr val="dk1"/>
               </a:buClr>
@@ -9976,23 +12168,71 @@
               <a:buNone/>
             </a:pPr>
             <a:r>
-              <a:rPr lang="en" sz="2800">
+              <a:rPr lang="en" sz="1100">
                 <a:solidFill>
                   <a:schemeClr val="dk1"/>
                 </a:solidFill>
               </a:rPr>
-              <a:t>•Data</a:t>
-            </a:r>
-            <a:endParaRPr sz="2800">
+              <a:t>The model was mainly measured on loss and our own interpretation of whether we thought the output could pass as an album art image or not. The accuracy and loss metrics were mainly helpful if the generator or discriminator rapidly approached zero or mode collapsed. From our research, we have seen that the loss can fluctuate and even if the generator or discriminator have a loss between .5 – 5 the output could still be good or bad. Metrics really just helped us keep an eye on the training to alert us if there were any drastic changes made. Otherwise, every 50 or so epochs we would have the output printed to screen to see what it looked like and judged our model based off of that.</a:t>
+            </a:r>
+            <a:endParaRPr sz="1100">
               <a:solidFill>
                 <a:schemeClr val="dk1"/>
               </a:solidFill>
             </a:endParaRPr>
           </a:p>
           <a:p>
+            <a:pPr indent="457200" lvl="0" marL="457200" rtl="0" algn="just">
+              <a:spcBef>
+                <a:spcPts val="600"/>
+              </a:spcBef>
+              <a:spcAft>
+                <a:spcPts val="0"/>
+              </a:spcAft>
+              <a:buNone/>
+            </a:pPr>
+            <a:r>
+              <a:rPr b="1" lang="en" sz="1100">
+                <a:solidFill>
+                  <a:schemeClr val="dk1"/>
+                </a:solidFill>
+              </a:rPr>
+              <a:t>Graph of first version loss</a:t>
+            </a:r>
+            <a:endParaRPr b="1" sz="1100">
+              <a:solidFill>
+                <a:schemeClr val="dk1"/>
+              </a:solidFill>
+            </a:endParaRPr>
+          </a:p>
+          <a:p>
+            <a:pPr indent="0" lvl="0" marL="0" rtl="0" algn="just">
+              <a:spcBef>
+                <a:spcPts val="600"/>
+              </a:spcBef>
+              <a:spcAft>
+                <a:spcPts val="0"/>
+              </a:spcAft>
+              <a:buClr>
+                <a:schemeClr val="dk1"/>
+              </a:buClr>
+              <a:buSzPts val="1100"/>
+              <a:buFont typeface="Arial"/>
+              <a:buNone/>
+            </a:pPr>
+            <a:r>
+              <a:t/>
+            </a:r>
+            <a:endParaRPr sz="1100">
+              <a:solidFill>
+                <a:schemeClr val="dk1"/>
+              </a:solidFill>
+            </a:endParaRPr>
+          </a:p>
+          <a:p>
             <a:pPr indent="0" lvl="0" marL="0" rtl="0" algn="l">
               <a:spcBef>
-                <a:spcPts val="0"/>
+                <a:spcPts val="600"/>
               </a:spcBef>
               <a:spcAft>
                 <a:spcPts val="1600"/>
@@ -10001,6 +12241,108 @@
             </a:pPr>
             <a:r>
               <a:t/>
+            </a:r>
+            <a:endParaRPr/>
+          </a:p>
+        </p:txBody>
+      </p:sp>
+      <p:pic>
+        <p:nvPicPr>
+          <p:cNvPr id="87" name="Google Shape;87;p18"/>
+          <p:cNvPicPr preferRelativeResize="0"/>
+          <p:nvPr/>
+        </p:nvPicPr>
+        <p:blipFill>
+          <a:blip r:embed="rId3">
+            <a:alphaModFix/>
+          </a:blip>
+          <a:stretch>
+            <a:fillRect/>
+          </a:stretch>
+        </p:blipFill>
+        <p:spPr>
+          <a:xfrm>
+            <a:off x="175675" y="2790875"/>
+            <a:ext cx="4082674" cy="2172200"/>
+          </a:xfrm>
+          <a:prstGeom prst="rect">
+            <a:avLst/>
+          </a:prstGeom>
+          <a:noFill/>
+          <a:ln>
+            <a:noFill/>
+          </a:ln>
+        </p:spPr>
+      </p:pic>
+      <p:pic>
+        <p:nvPicPr>
+          <p:cNvPr id="88" name="Google Shape;88;p18"/>
+          <p:cNvPicPr preferRelativeResize="0"/>
+          <p:nvPr/>
+        </p:nvPicPr>
+        <p:blipFill>
+          <a:blip r:embed="rId4">
+            <a:alphaModFix/>
+          </a:blip>
+          <a:stretch>
+            <a:fillRect/>
+          </a:stretch>
+        </p:blipFill>
+        <p:spPr>
+          <a:xfrm>
+            <a:off x="4572012" y="2712025"/>
+            <a:ext cx="4368825" cy="2431475"/>
+          </a:xfrm>
+          <a:prstGeom prst="rect">
+            <a:avLst/>
+          </a:prstGeom>
+          <a:noFill/>
+          <a:ln>
+            <a:noFill/>
+          </a:ln>
+        </p:spPr>
+      </p:pic>
+      <p:sp>
+        <p:nvSpPr>
+          <p:cNvPr id="89" name="Google Shape;89;p18"/>
+          <p:cNvSpPr txBox="1"/>
+          <p:nvPr/>
+        </p:nvSpPr>
+        <p:spPr>
+          <a:xfrm>
+            <a:off x="5256413" y="2410000"/>
+            <a:ext cx="3000000" cy="634800"/>
+          </a:xfrm>
+          <a:prstGeom prst="rect">
+            <a:avLst/>
+          </a:prstGeom>
+          <a:noFill/>
+          <a:ln>
+            <a:noFill/>
+          </a:ln>
+        </p:spPr>
+        <p:txBody>
+          <a:bodyPr anchorCtr="0" anchor="t" bIns="91425" lIns="91425" spcFirstLastPara="1" rIns="91425" wrap="square" tIns="91425">
+            <a:noAutofit/>
+          </a:bodyPr>
+          <a:lstStyle/>
+          <a:p>
+            <a:pPr indent="0" lvl="0" marL="0" rtl="0" algn="l">
+              <a:spcBef>
+                <a:spcPts val="0"/>
+              </a:spcBef>
+              <a:spcAft>
+                <a:spcPts val="0"/>
+              </a:spcAft>
+              <a:buNone/>
+            </a:pPr>
+            <a:r>
+              <a:rPr b="1" lang="en" sz="1200">
+                <a:solidFill>
+                  <a:schemeClr val="dk1"/>
+                </a:solidFill>
+              </a:rPr>
+              <a:t>Loss Graph after architecture revision</a:t>
             </a:r>
             <a:endParaRPr/>
           </a:p>
@@ -10019,7 +12361,7 @@
   <p:cSld>
     <p:spTree>
       <p:nvGrpSpPr>
-        <p:cNvPr id="90" name="Shape 90"/>
+        <p:cNvPr id="93" name="Shape 93"/>
         <p:cNvGrpSpPr/>
         <p:nvPr/>
       </p:nvGrpSpPr>
@@ -10033,7 +12375,7 @@
       </p:grpSpPr>
       <p:sp>
         <p:nvSpPr>
-          <p:cNvPr id="91" name="Google Shape;91;p19"/>
+          <p:cNvPr id="94" name="Google Shape;94;p19"/>
           <p:cNvSpPr txBox="1"/>
           <p:nvPr>
             <p:ph type="title"/>
@@ -10073,7 +12415,7 @@
       </p:sp>
       <p:sp>
         <p:nvSpPr>
-          <p:cNvPr id="92" name="Google Shape;92;p19"/>
+          <p:cNvPr id="95" name="Google Shape;95;p19"/>
           <p:cNvSpPr txBox="1"/>
           <p:nvPr>
             <p:ph idx="1" type="body"/>
@@ -10107,40 +12449,30 @@
               <a:buNone/>
             </a:pPr>
             <a:r>
-              <a:rPr lang="en" sz="2200">
+              <a:rPr b="1" lang="en" sz="2400">
                 <a:solidFill>
                   <a:schemeClr val="dk1"/>
                 </a:solidFill>
               </a:rPr>
-              <a:t>•Mode</a:t>
-            </a:r>
-            <a:r>
-              <a:rPr lang="en" sz="2200">
-                <a:solidFill>
-                  <a:schemeClr val="dk1"/>
-                </a:solidFill>
-              </a:rPr>
-              <a:t>l</a:t>
-            </a:r>
-            <a:endParaRPr sz="2200">
+              <a:t>Model</a:t>
+            </a:r>
+            <a:endParaRPr b="1" sz="2400">
               <a:solidFill>
                 <a:schemeClr val="dk1"/>
               </a:solidFill>
             </a:endParaRPr>
           </a:p>
           <a:p>
-            <a:pPr indent="0" lvl="0" marL="0" rtl="0" algn="just">
-              <a:spcBef>
-                <a:spcPts val="0"/>
-              </a:spcBef>
-              <a:spcAft>
-                <a:spcPts val="0"/>
-              </a:spcAft>
-              <a:buClr>
-                <a:schemeClr val="dk1"/>
-              </a:buClr>
-              <a:buSzPts val="1100"/>
-              <a:buFont typeface="Arial"/>
+            <a:pPr indent="0" lvl="0" marL="0" rtl="0" algn="l">
+              <a:lnSpc>
+                <a:spcPct val="90000"/>
+              </a:lnSpc>
+              <a:spcBef>
+                <a:spcPts val="1000"/>
+              </a:spcBef>
+              <a:spcAft>
+                <a:spcPts val="0"/>
+              </a:spcAft>
               <a:buNone/>
             </a:pPr>
             <a:r>
@@ -10149,7 +12481,7 @@
                   <a:schemeClr val="dk1"/>
                 </a:solidFill>
               </a:rPr>
-              <a:t>The model was mainly measured on loss and our own interpretation of whether we thought the output could pass as an album art image or not. The accuracy and loss metrics were mainly helpful if the generator or discriminator rapidly approached zero or mode collapsed. From our research, we have seen that the loss can fluctuate and even if the generator or discriminator have a loss between .5 – 5 the output could still be good or bad. Metrics really just helped us keep an eye on the training to alert us if there were any drastic changes made. Otherwise, every 50 or so epochs we would have the output printed to screen to see what it looked like and judged our model based off of that.</a:t>
+              <a:t>Our model is a deep convolutional generative adversarial network. We chose this architecture due to it being more stable than other GAN’s. We considered using StyleGAN, but the custom libraries and setup would have taken more time which would have given us less time to experiment. The architecture consists of a generator model and discriminator model. Both have convolutional layers and batch normalization layers. The discriminator model is trained on both the dataset of sourced images, and the output of the generator. Each epoch, the discriminator is updated on whether it was good at detecting a real vs generated image, and the generator is updated on whether it was able to trick the discriminator or not.</a:t>
             </a:r>
             <a:endParaRPr sz="1100">
               <a:solidFill>
@@ -10158,42 +12490,13 @@
             </a:endParaRPr>
           </a:p>
           <a:p>
-            <a:pPr indent="457200" lvl="0" marL="457200" rtl="0" algn="just">
-              <a:spcBef>
-                <a:spcPts val="600"/>
-              </a:spcBef>
-              <a:spcAft>
-                <a:spcPts val="0"/>
-              </a:spcAft>
-              <a:buNone/>
-            </a:pPr>
-            <a:r>
-              <a:rPr b="1" lang="en" sz="1100">
-                <a:solidFill>
-                  <a:schemeClr val="dk1"/>
-                </a:solidFill>
-              </a:rPr>
-              <a:t>Graph of first version loss</a:t>
-            </a:r>
-            <a:endParaRPr b="1" sz="1100">
-              <a:solidFill>
-                <a:schemeClr val="dk1"/>
-              </a:solidFill>
-            </a:endParaRPr>
-          </a:p>
-          <a:p>
             <a:pPr indent="0" lvl="0" marL="0" rtl="0" algn="just">
               <a:spcBef>
-                <a:spcPts val="600"/>
-              </a:spcBef>
-              <a:spcAft>
-                <a:spcPts val="0"/>
-              </a:spcAft>
-              <a:buClr>
-                <a:schemeClr val="dk1"/>
-              </a:buClr>
-              <a:buSzPts val="1100"/>
-              <a:buFont typeface="Arial"/>
+                <a:spcPts val="0"/>
+              </a:spcBef>
+              <a:spcAft>
+                <a:spcPts val="0"/>
+              </a:spcAft>
               <a:buNone/>
             </a:pPr>
             <a:r>
@@ -10217,108 +12520,6 @@
             </a:pPr>
             <a:r>
               <a:t/>
-            </a:r>
-            <a:endParaRPr/>
-          </a:p>
-        </p:txBody>
-      </p:sp>
-      <p:pic>
-        <p:nvPicPr>
-          <p:cNvPr id="93" name="Google Shape;93;p19"/>
-          <p:cNvPicPr preferRelativeResize="0"/>
-          <p:nvPr/>
-        </p:nvPicPr>
-        <p:blipFill>
-          <a:blip r:embed="rId3">
-            <a:alphaModFix/>
-          </a:blip>
-          <a:stretch>
-            <a:fillRect/>
-          </a:stretch>
-        </p:blipFill>
-        <p:spPr>
-          <a:xfrm>
-            <a:off x="175675" y="2790875"/>
-            <a:ext cx="4082674" cy="2172200"/>
-          </a:xfrm>
-          <a:prstGeom prst="rect">
-            <a:avLst/>
-          </a:prstGeom>
-          <a:noFill/>
-          <a:ln>
-            <a:noFill/>
-          </a:ln>
-        </p:spPr>
-      </p:pic>
-      <p:pic>
-        <p:nvPicPr>
-          <p:cNvPr id="94" name="Google Shape;94;p19"/>
-          <p:cNvPicPr preferRelativeResize="0"/>
-          <p:nvPr/>
-        </p:nvPicPr>
-        <p:blipFill>
-          <a:blip r:embed="rId4">
-            <a:alphaModFix/>
-          </a:blip>
-          <a:stretch>
-            <a:fillRect/>
-          </a:stretch>
-        </p:blipFill>
-        <p:spPr>
-          <a:xfrm>
-            <a:off x="4572000" y="2531600"/>
-            <a:ext cx="4368825" cy="2431475"/>
-          </a:xfrm>
-          <a:prstGeom prst="rect">
-            <a:avLst/>
-          </a:prstGeom>
-          <a:noFill/>
-          <a:ln>
-            <a:noFill/>
-          </a:ln>
-        </p:spPr>
-      </p:pic>
-      <p:sp>
-        <p:nvSpPr>
-          <p:cNvPr id="95" name="Google Shape;95;p19"/>
-          <p:cNvSpPr txBox="1"/>
-          <p:nvPr/>
-        </p:nvSpPr>
-        <p:spPr>
-          <a:xfrm>
-            <a:off x="5256413" y="2322500"/>
-            <a:ext cx="3000000" cy="3000000"/>
-          </a:xfrm>
-          <a:prstGeom prst="rect">
-            <a:avLst/>
-          </a:prstGeom>
-          <a:noFill/>
-          <a:ln>
-            <a:noFill/>
-          </a:ln>
-        </p:spPr>
-        <p:txBody>
-          <a:bodyPr anchorCtr="0" anchor="t" bIns="91425" lIns="91425" spcFirstLastPara="1" rIns="91425" wrap="square" tIns="91425">
-            <a:noAutofit/>
-          </a:bodyPr>
-          <a:lstStyle/>
-          <a:p>
-            <a:pPr indent="0" lvl="0" marL="0" rtl="0" algn="l">
-              <a:spcBef>
-                <a:spcPts val="0"/>
-              </a:spcBef>
-              <a:spcAft>
-                <a:spcPts val="0"/>
-              </a:spcAft>
-              <a:buNone/>
-            </a:pPr>
-            <a:r>
-              <a:rPr b="1" lang="en" sz="1200">
-                <a:solidFill>
-                  <a:schemeClr val="dk1"/>
-                </a:solidFill>
-              </a:rPr>
-              <a:t>Loss Graph after architecture revision</a:t>
             </a:r>
             <a:endParaRPr/>
           </a:p>
@@ -10399,8 +12600,8 @@
         </p:nvSpPr>
         <p:spPr>
           <a:xfrm>
-            <a:off x="213475" y="769925"/>
-            <a:ext cx="8401500" cy="3179400"/>
+            <a:off x="213475" y="778250"/>
+            <a:ext cx="2260500" cy="647400"/>
           </a:xfrm>
           <a:prstGeom prst="rect">
             <a:avLst/>
@@ -10425,51 +12626,31 @@
               <a:buNone/>
             </a:pPr>
             <a:r>
-              <a:rPr lang="en" sz="2200">
+              <a:rPr b="1" lang="en" sz="2400">
                 <a:solidFill>
                   <a:schemeClr val="dk1"/>
                 </a:solidFill>
               </a:rPr>
-              <a:t>•Model</a:t>
-            </a:r>
-            <a:endParaRPr sz="2200">
+              <a:t>Discriminator </a:t>
+            </a:r>
+            <a:endParaRPr b="1" sz="2400">
               <a:solidFill>
                 <a:schemeClr val="dk1"/>
               </a:solidFill>
             </a:endParaRPr>
           </a:p>
           <a:p>
-            <a:pPr indent="0" lvl="0" marL="0" rtl="0" algn="l">
-              <a:lnSpc>
-                <a:spcPct val="90000"/>
-              </a:lnSpc>
-              <a:spcBef>
-                <a:spcPts val="1000"/>
-              </a:spcBef>
-              <a:spcAft>
-                <a:spcPts val="0"/>
-              </a:spcAft>
-              <a:buNone/>
-            </a:pPr>
-            <a:r>
-              <a:rPr lang="en" sz="700">
-                <a:solidFill>
-                  <a:schemeClr val="dk1"/>
-                </a:solidFill>
-                <a:latin typeface="Times New Roman"/>
-                <a:ea typeface="Times New Roman"/>
-                <a:cs typeface="Times New Roman"/>
-                <a:sym typeface="Times New Roman"/>
-              </a:rPr>
-              <a:t> </a:t>
-            </a:r>
-            <a:r>
-              <a:rPr lang="en" sz="1100">
-                <a:solidFill>
-                  <a:schemeClr val="dk1"/>
-                </a:solidFill>
-              </a:rPr>
-              <a:t>Our model is a deep convolutional generative adversarial network. We chose this architecture due to it being more stable than other GAN’s. We considered using StyleGAN, but the custom libraries and setup would have taken more time which would have given us less time to experiment. The architecture consists of a generator model and discriminator model. Both have convolutional layers and batch normalization layers. The discriminator model is trained on both the dataset of sourced images, and the output of the generator. Each epoch, the discriminator is updated on whether it was good at detecting a real vs generated image, and the generator is updated on whether it was able to trick the discriminator or not.</a:t>
+            <a:pPr indent="0" lvl="0" marL="0" rtl="0" algn="just">
+              <a:spcBef>
+                <a:spcPts val="0"/>
+              </a:spcBef>
+              <a:spcAft>
+                <a:spcPts val="0"/>
+              </a:spcAft>
+              <a:buNone/>
+            </a:pPr>
+            <a:r>
+              <a:t/>
             </a:r>
             <a:endParaRPr sz="1100">
               <a:solidFill>
@@ -10478,25 +12659,6 @@
             </a:endParaRPr>
           </a:p>
           <a:p>
-            <a:pPr indent="0" lvl="0" marL="0" rtl="0" algn="just">
-              <a:spcBef>
-                <a:spcPts val="0"/>
-              </a:spcBef>
-              <a:spcAft>
-                <a:spcPts val="0"/>
-              </a:spcAft>
-              <a:buNone/>
-            </a:pPr>
-            <a:r>
-              <a:t/>
-            </a:r>
-            <a:endParaRPr sz="1100">
-              <a:solidFill>
-                <a:schemeClr val="dk1"/>
-              </a:solidFill>
-            </a:endParaRPr>
-          </a:p>
-          <a:p>
             <a:pPr indent="0" lvl="0" marL="0" rtl="0" algn="l">
               <a:spcBef>
                 <a:spcPts val="600"/>
@@ -10513,6 +12675,111 @@
           </a:p>
         </p:txBody>
       </p:sp>
+      <p:sp>
+        <p:nvSpPr>
+          <p:cNvPr id="102" name="Google Shape;102;p20"/>
+          <p:cNvSpPr txBox="1"/>
+          <p:nvPr/>
+        </p:nvSpPr>
+        <p:spPr>
+          <a:xfrm>
+            <a:off x="5803150" y="715850"/>
+            <a:ext cx="3000000" cy="709800"/>
+          </a:xfrm>
+          <a:prstGeom prst="rect">
+            <a:avLst/>
+          </a:prstGeom>
+          <a:noFill/>
+          <a:ln>
+            <a:noFill/>
+          </a:ln>
+        </p:spPr>
+        <p:txBody>
+          <a:bodyPr anchorCtr="0" anchor="t" bIns="91425" lIns="91425" spcFirstLastPara="1" rIns="91425" wrap="square" tIns="91425">
+            <a:noAutofit/>
+          </a:bodyPr>
+          <a:lstStyle/>
+          <a:p>
+            <a:pPr indent="0" lvl="0" marL="0" rtl="0" algn="l">
+              <a:lnSpc>
+                <a:spcPct val="90000"/>
+              </a:lnSpc>
+              <a:spcBef>
+                <a:spcPts val="1000"/>
+              </a:spcBef>
+              <a:spcAft>
+                <a:spcPts val="0"/>
+              </a:spcAft>
+              <a:buNone/>
+            </a:pPr>
+            <a:r>
+              <a:rPr b="1" lang="en" sz="2400">
+                <a:solidFill>
+                  <a:schemeClr val="dk1"/>
+                </a:solidFill>
+              </a:rPr>
+              <a:t>Generator</a:t>
+            </a:r>
+            <a:endParaRPr/>
+          </a:p>
+        </p:txBody>
+      </p:sp>
+      <p:pic>
+        <p:nvPicPr>
+          <p:cNvPr id="103" name="Google Shape;103;p20"/>
+          <p:cNvPicPr preferRelativeResize="0"/>
+          <p:nvPr/>
+        </p:nvPicPr>
+        <p:blipFill>
+          <a:blip r:embed="rId3">
+            <a:alphaModFix/>
+          </a:blip>
+          <a:stretch>
+            <a:fillRect/>
+          </a:stretch>
+        </p:blipFill>
+        <p:spPr>
+          <a:xfrm>
+            <a:off x="758578" y="1471450"/>
+            <a:ext cx="897522" cy="3442128"/>
+          </a:xfrm>
+          <a:prstGeom prst="rect">
+            <a:avLst/>
+          </a:prstGeom>
+          <a:noFill/>
+          <a:ln>
+            <a:noFill/>
+          </a:ln>
+        </p:spPr>
+      </p:pic>
+      <p:pic>
+        <p:nvPicPr>
+          <p:cNvPr id="104" name="Google Shape;104;p20"/>
+          <p:cNvPicPr preferRelativeResize="0"/>
+          <p:nvPr/>
+        </p:nvPicPr>
+        <p:blipFill>
+          <a:blip r:embed="rId4">
+            <a:alphaModFix/>
+          </a:blip>
+          <a:stretch>
+            <a:fillRect/>
+          </a:stretch>
+        </p:blipFill>
+        <p:spPr>
+          <a:xfrm>
+            <a:off x="6139600" y="1326487"/>
+            <a:ext cx="1193125" cy="3732051"/>
+          </a:xfrm>
+          <a:prstGeom prst="rect">
+            <a:avLst/>
+          </a:prstGeom>
+          <a:noFill/>
+          <a:ln>
+            <a:noFill/>
+          </a:ln>
+        </p:spPr>
+      </p:pic>
     </p:spTree>
   </p:cSld>
   <p:clrMapOvr>
@@ -10526,7 +12793,7 @@
   <p:cSld>
     <p:spTree>
       <p:nvGrpSpPr>
-        <p:cNvPr id="105" name="Shape 105"/>
+        <p:cNvPr id="108" name="Shape 108"/>
         <p:cNvGrpSpPr/>
         <p:nvPr/>
       </p:nvGrpSpPr>
@@ -10540,7 +12807,7 @@
       </p:grpSpPr>
       <p:sp>
         <p:nvSpPr>
-          <p:cNvPr id="106" name="Google Shape;106;p21"/>
+          <p:cNvPr id="109" name="Google Shape;109;p21"/>
           <p:cNvSpPr txBox="1"/>
           <p:nvPr>
             <p:ph type="title"/>
@@ -10580,7 +12847,7 @@
       </p:sp>
       <p:sp>
         <p:nvSpPr>
-          <p:cNvPr id="107" name="Google Shape;107;p21"/>
+          <p:cNvPr id="110" name="Google Shape;110;p21"/>
           <p:cNvSpPr txBox="1"/>
           <p:nvPr>
             <p:ph idx="1" type="body"/>
@@ -10614,14 +12881,36 @@
               <a:buNone/>
             </a:pPr>
             <a:r>
-              <a:rPr lang="en" sz="2200">
+              <a:rPr b="1" lang="en" sz="2400">
                 <a:solidFill>
                   <a:schemeClr val="dk1"/>
                 </a:solidFill>
               </a:rPr>
-              <a:t>•Training</a:t>
-            </a:r>
-            <a:endParaRPr sz="2200">
+              <a:t>Training</a:t>
+            </a:r>
+            <a:endParaRPr b="1" sz="2400">
+              <a:solidFill>
+                <a:schemeClr val="dk1"/>
+              </a:solidFill>
+            </a:endParaRPr>
+          </a:p>
+          <a:p>
+            <a:pPr indent="0" lvl="0" marL="0" rtl="0" algn="l">
+              <a:lnSpc>
+                <a:spcPct val="90000"/>
+              </a:lnSpc>
+              <a:spcBef>
+                <a:spcPts val="1000"/>
+              </a:spcBef>
+              <a:spcAft>
+                <a:spcPts val="0"/>
+              </a:spcAft>
+              <a:buNone/>
+            </a:pPr>
+            <a:r>
+              <a:t/>
+            </a:r>
+            <a:endParaRPr>
               <a:solidFill>
                 <a:schemeClr val="dk1"/>
               </a:solidFill>

</xml_diff>